<commit_message>
CS3210 TL2, fixes for W1 material
</commit_message>
<xml_diff>
--- a/CS2100/CS2100 Tutorial 1.pptx
+++ b/CS2100/CS2100 Tutorial 1.pptx
@@ -5,7 +5,7 @@
     <p:sldMasterId id="2147483648" r:id="rId1"/>
   </p:sldMasterIdLst>
   <p:notesMasterIdLst>
-    <p:notesMasterId r:id="rId36"/>
+    <p:notesMasterId r:id="rId29"/>
   </p:notesMasterIdLst>
   <p:sldIdLst>
     <p:sldId id="256" r:id="rId2"/>
@@ -20,28 +20,21 @@
     <p:sldId id="274" r:id="rId11"/>
     <p:sldId id="275" r:id="rId12"/>
     <p:sldId id="312" r:id="rId13"/>
-    <p:sldId id="308" r:id="rId14"/>
-    <p:sldId id="309" r:id="rId15"/>
-    <p:sldId id="310" r:id="rId16"/>
-    <p:sldId id="311" r:id="rId17"/>
-    <p:sldId id="279" r:id="rId18"/>
-    <p:sldId id="307" r:id="rId19"/>
-    <p:sldId id="276" r:id="rId20"/>
-    <p:sldId id="313" r:id="rId21"/>
-    <p:sldId id="314" r:id="rId22"/>
-    <p:sldId id="315" r:id="rId23"/>
-    <p:sldId id="316" r:id="rId24"/>
-    <p:sldId id="317" r:id="rId25"/>
-    <p:sldId id="318" r:id="rId26"/>
-    <p:sldId id="320" r:id="rId27"/>
-    <p:sldId id="319" r:id="rId28"/>
-    <p:sldId id="321" r:id="rId29"/>
-    <p:sldId id="322" r:id="rId30"/>
-    <p:sldId id="323" r:id="rId31"/>
-    <p:sldId id="324" r:id="rId32"/>
-    <p:sldId id="325" r:id="rId33"/>
-    <p:sldId id="290" r:id="rId34"/>
-    <p:sldId id="288" r:id="rId35"/>
+    <p:sldId id="279" r:id="rId14"/>
+    <p:sldId id="307" r:id="rId15"/>
+    <p:sldId id="276" r:id="rId16"/>
+    <p:sldId id="316" r:id="rId17"/>
+    <p:sldId id="317" r:id="rId18"/>
+    <p:sldId id="318" r:id="rId19"/>
+    <p:sldId id="320" r:id="rId20"/>
+    <p:sldId id="319" r:id="rId21"/>
+    <p:sldId id="321" r:id="rId22"/>
+    <p:sldId id="322" r:id="rId23"/>
+    <p:sldId id="323" r:id="rId24"/>
+    <p:sldId id="324" r:id="rId25"/>
+    <p:sldId id="325" r:id="rId26"/>
+    <p:sldId id="290" r:id="rId27"/>
+    <p:sldId id="288" r:id="rId28"/>
   </p:sldIdLst>
   <p:sldSz cx="12192000" cy="6858000"/>
   <p:notesSz cx="6858000" cy="9144000"/>
@@ -230,7 +223,7 @@
           <a:p>
             <a:fld id="{88602102-26BC-4ECA-9243-6BB9B8BC366F}" type="datetimeFigureOut">
               <a:rPr lang="en-US" smtClean="0"/>
-              <a:t>8/26/2024</a:t>
+              <a:t>9/1/2024</a:t>
             </a:fld>
             <a:endParaRPr lang="en-US"/>
           </a:p>
@@ -581,627 +574,6 @@
 </p:notes>
 </file>
 
-<file path=ppt/notesSlides/notesSlide10.xml><?xml version="1.0" encoding="utf-8"?>
-<p:notes xmlns:a="http://schemas.openxmlformats.org/drawingml/2006/main" xmlns:r="http://schemas.openxmlformats.org/officeDocument/2006/relationships" xmlns:p="http://schemas.openxmlformats.org/presentationml/2006/main">
-  <p:cSld>
-    <p:spTree>
-      <p:nvGrpSpPr>
-        <p:cNvPr id="1" name=""/>
-        <p:cNvGrpSpPr/>
-        <p:nvPr/>
-      </p:nvGrpSpPr>
-      <p:grpSpPr>
-        <a:xfrm>
-          <a:off x="0" y="0"/>
-          <a:ext cx="0" cy="0"/>
-          <a:chOff x="0" y="0"/>
-          <a:chExt cx="0" cy="0"/>
-        </a:xfrm>
-      </p:grpSpPr>
-      <p:sp>
-        <p:nvSpPr>
-          <p:cNvPr id="2" name="Slide Image Placeholder 1"/>
-          <p:cNvSpPr>
-            <a:spLocks noGrp="1" noRot="1" noChangeAspect="1"/>
-          </p:cNvSpPr>
-          <p:nvPr>
-            <p:ph type="sldImg"/>
-          </p:nvPr>
-        </p:nvSpPr>
-        <p:spPr/>
-      </p:sp>
-      <p:sp>
-        <p:nvSpPr>
-          <p:cNvPr id="3" name="Notes Placeholder 2"/>
-          <p:cNvSpPr>
-            <a:spLocks noGrp="1"/>
-          </p:cNvSpPr>
-          <p:nvPr>
-            <p:ph type="body" idx="1"/>
-          </p:nvPr>
-        </p:nvSpPr>
-        <p:spPr/>
-        <p:txBody>
-          <a:bodyPr/>
-          <a:lstStyle/>
-          <a:p>
-            <a:r>
-              <a:rPr lang="en-US"/>
-              <a:t>
-Poll Title: Do not modify the notes in this section to avoid tampering with the Poll Everywhere activity.
-More info at polleverywhere.com/support
-Can sign extension work for sign-and-magnitude system?
-https://www.polleverywhere.com/multiple_choice_polls/X2XiBqmrpvIuzKHB8HyLz?display_state=instructions&amp;activity_state=opened&amp;state=opened&amp;flow=Engagement&amp;onscreen=persist</a:t>
-            </a:r>
-          </a:p>
-        </p:txBody>
-      </p:sp>
-      <p:sp>
-        <p:nvSpPr>
-          <p:cNvPr id="4" name="Slide Number Placeholder 3"/>
-          <p:cNvSpPr>
-            <a:spLocks noGrp="1"/>
-          </p:cNvSpPr>
-          <p:nvPr>
-            <p:ph type="sldNum" sz="quarter" idx="5"/>
-          </p:nvPr>
-        </p:nvSpPr>
-        <p:spPr/>
-        <p:txBody>
-          <a:bodyPr/>
-          <a:lstStyle/>
-          <a:p>
-            <a:fld id="{D17C5EEA-D671-4453-97C7-AF6A67BC87D3}" type="slidenum">
-              <a:rPr lang="en-US" smtClean="0"/>
-              <a:t>20</a:t>
-            </a:fld>
-            <a:endParaRPr lang="en-US"/>
-          </a:p>
-        </p:txBody>
-      </p:sp>
-      <p:sp>
-        <p:nvSpPr>
-          <p:cNvPr id="5" name="TextBox 4">
-            <a:extLst>
-              <a:ext uri="{FF2B5EF4-FFF2-40B4-BE49-F238E27FC236}">
-                <a16:creationId xmlns:a16="http://schemas.microsoft.com/office/drawing/2014/main" id="{37EA7F51-8A1A-7B0B-E41B-C8A95760F5CD}"/>
-              </a:ext>
-            </a:extLst>
-          </p:cNvPr>
-          <p:cNvSpPr txBox="1"/>
-          <p:nvPr/>
-        </p:nvSpPr>
-        <p:spPr>
-          <a:xfrm>
-            <a:off x="0" y="0"/>
-            <a:ext cx="3810000" cy="1270000"/>
-          </a:xfrm>
-          <a:prstGeom prst="rect">
-            <a:avLst/>
-          </a:prstGeom>
-          <a:noFill/>
-        </p:spPr>
-        <p:txBody>
-          <a:bodyPr vert="horz" rtlCol="0">
-            <a:spAutoFit/>
-          </a:bodyPr>
-          <a:lstStyle/>
-          <a:p>
-            <a:endParaRPr lang="en-US"/>
-          </a:p>
-        </p:txBody>
-      </p:sp>
-    </p:spTree>
-    <p:extLst>
-      <p:ext uri="{BB962C8B-B14F-4D97-AF65-F5344CB8AC3E}">
-        <p14:creationId xmlns:p14="http://schemas.microsoft.com/office/powerpoint/2010/main" val="52357211"/>
-      </p:ext>
-    </p:extLst>
-  </p:cSld>
-  <p:clrMapOvr>
-    <a:masterClrMapping/>
-  </p:clrMapOvr>
-</p:notes>
-</file>
-
-<file path=ppt/notesSlides/notesSlide11.xml><?xml version="1.0" encoding="utf-8"?>
-<p:notes xmlns:a="http://schemas.openxmlformats.org/drawingml/2006/main" xmlns:r="http://schemas.openxmlformats.org/officeDocument/2006/relationships" xmlns:p="http://schemas.openxmlformats.org/presentationml/2006/main">
-  <p:cSld>
-    <p:spTree>
-      <p:nvGrpSpPr>
-        <p:cNvPr id="1" name=""/>
-        <p:cNvGrpSpPr/>
-        <p:nvPr/>
-      </p:nvGrpSpPr>
-      <p:grpSpPr>
-        <a:xfrm>
-          <a:off x="0" y="0"/>
-          <a:ext cx="0" cy="0"/>
-          <a:chOff x="0" y="0"/>
-          <a:chExt cx="0" cy="0"/>
-        </a:xfrm>
-      </p:grpSpPr>
-      <p:sp>
-        <p:nvSpPr>
-          <p:cNvPr id="2" name="Slide Image Placeholder 1"/>
-          <p:cNvSpPr>
-            <a:spLocks noGrp="1" noRot="1" noChangeAspect="1"/>
-          </p:cNvSpPr>
-          <p:nvPr>
-            <p:ph type="sldImg"/>
-          </p:nvPr>
-        </p:nvSpPr>
-        <p:spPr/>
-      </p:sp>
-      <p:sp>
-        <p:nvSpPr>
-          <p:cNvPr id="3" name="Notes Placeholder 2"/>
-          <p:cNvSpPr>
-            <a:spLocks noGrp="1"/>
-          </p:cNvSpPr>
-          <p:nvPr>
-            <p:ph type="body" idx="1"/>
-          </p:nvPr>
-        </p:nvSpPr>
-        <p:spPr/>
-        <p:txBody>
-          <a:bodyPr/>
-          <a:lstStyle/>
-          <a:p>
-            <a:r>
-              <a:rPr lang="en-US" dirty="0"/>
-              <a:t>
-Poll Title: Do not modify the notes in this section to avoid tampering with the Poll Everywhere activity.
-More info at polleverywhere.com/support
-Can sign extension work for sign-and-magnitude system?
-https://www.polleverywhere.com/multiple_choice_polls/X2XiBqmrpvIuzKHB8HyLz?display_state=chart&amp;activity_state=opened&amp;state=opened&amp;flow=Engagement&amp;onscreen=persist</a:t>
-            </a:r>
-          </a:p>
-        </p:txBody>
-      </p:sp>
-      <p:sp>
-        <p:nvSpPr>
-          <p:cNvPr id="4" name="Slide Number Placeholder 3"/>
-          <p:cNvSpPr>
-            <a:spLocks noGrp="1"/>
-          </p:cNvSpPr>
-          <p:nvPr>
-            <p:ph type="sldNum" sz="quarter" idx="5"/>
-          </p:nvPr>
-        </p:nvSpPr>
-        <p:spPr/>
-        <p:txBody>
-          <a:bodyPr/>
-          <a:lstStyle/>
-          <a:p>
-            <a:fld id="{D17C5EEA-D671-4453-97C7-AF6A67BC87D3}" type="slidenum">
-              <a:rPr lang="en-US" smtClean="0"/>
-              <a:t>21</a:t>
-            </a:fld>
-            <a:endParaRPr lang="en-US"/>
-          </a:p>
-        </p:txBody>
-      </p:sp>
-      <p:sp>
-        <p:nvSpPr>
-          <p:cNvPr id="5" name="TextBox 4">
-            <a:extLst>
-              <a:ext uri="{FF2B5EF4-FFF2-40B4-BE49-F238E27FC236}">
-                <a16:creationId xmlns:a16="http://schemas.microsoft.com/office/drawing/2014/main" id="{C7A8CECB-5FBF-2AAC-49E5-DE6EE28B1EFC}"/>
-              </a:ext>
-            </a:extLst>
-          </p:cNvPr>
-          <p:cNvSpPr txBox="1"/>
-          <p:nvPr/>
-        </p:nvSpPr>
-        <p:spPr>
-          <a:xfrm>
-            <a:off x="0" y="0"/>
-            <a:ext cx="3810000" cy="1270000"/>
-          </a:xfrm>
-          <a:prstGeom prst="rect">
-            <a:avLst/>
-          </a:prstGeom>
-          <a:noFill/>
-        </p:spPr>
-        <p:txBody>
-          <a:bodyPr vert="horz" rtlCol="0">
-            <a:spAutoFit/>
-          </a:bodyPr>
-          <a:lstStyle/>
-          <a:p>
-            <a:endParaRPr lang="en-US"/>
-          </a:p>
-        </p:txBody>
-      </p:sp>
-    </p:spTree>
-    <p:extLst>
-      <p:ext uri="{BB962C8B-B14F-4D97-AF65-F5344CB8AC3E}">
-        <p14:creationId xmlns:p14="http://schemas.microsoft.com/office/powerpoint/2010/main" val="4167908616"/>
-      </p:ext>
-    </p:extLst>
-  </p:cSld>
-  <p:clrMapOvr>
-    <a:masterClrMapping/>
-  </p:clrMapOvr>
-</p:notes>
-</file>
-
-<file path=ppt/notesSlides/notesSlide12.xml><?xml version="1.0" encoding="utf-8"?>
-<p:notes xmlns:a="http://schemas.openxmlformats.org/drawingml/2006/main" xmlns:r="http://schemas.openxmlformats.org/officeDocument/2006/relationships" xmlns:p="http://schemas.openxmlformats.org/presentationml/2006/main">
-  <p:cSld>
-    <p:spTree>
-      <p:nvGrpSpPr>
-        <p:cNvPr id="1" name=""/>
-        <p:cNvGrpSpPr/>
-        <p:nvPr/>
-      </p:nvGrpSpPr>
-      <p:grpSpPr>
-        <a:xfrm>
-          <a:off x="0" y="0"/>
-          <a:ext cx="0" cy="0"/>
-          <a:chOff x="0" y="0"/>
-          <a:chExt cx="0" cy="0"/>
-        </a:xfrm>
-      </p:grpSpPr>
-      <p:sp>
-        <p:nvSpPr>
-          <p:cNvPr id="2" name="Slide Image Placeholder 1"/>
-          <p:cNvSpPr>
-            <a:spLocks noGrp="1" noRot="1" noChangeAspect="1"/>
-          </p:cNvSpPr>
-          <p:nvPr>
-            <p:ph type="sldImg"/>
-          </p:nvPr>
-        </p:nvSpPr>
-        <p:spPr/>
-      </p:sp>
-      <p:sp>
-        <p:nvSpPr>
-          <p:cNvPr id="3" name="Notes Placeholder 2"/>
-          <p:cNvSpPr>
-            <a:spLocks noGrp="1"/>
-          </p:cNvSpPr>
-          <p:nvPr>
-            <p:ph type="body" idx="1"/>
-          </p:nvPr>
-        </p:nvSpPr>
-        <p:spPr/>
-        <p:txBody>
-          <a:bodyPr/>
-          <a:lstStyle/>
-          <a:p>
-            <a:r>
-              <a:rPr lang="en-US" dirty="0"/>
-              <a:t>
-Poll Title: Do not modify the notes in this section to avoid tampering with the Poll Everywhere activity.
-More info at polleverywhere.com/support
-Can sign extension work for sign-and-magnitude system?
-https://www.polleverywhere.com/multiple_choice_polls/X2XiBqmrpvIuzKHB8HyLz?display_state=chart&amp;activity_state=closed&amp;state=closed&amp;flow=Engagement&amp;onscreen=persist</a:t>
-            </a:r>
-          </a:p>
-        </p:txBody>
-      </p:sp>
-      <p:sp>
-        <p:nvSpPr>
-          <p:cNvPr id="4" name="Slide Number Placeholder 3"/>
-          <p:cNvSpPr>
-            <a:spLocks noGrp="1"/>
-          </p:cNvSpPr>
-          <p:nvPr>
-            <p:ph type="sldNum" sz="quarter" idx="5"/>
-          </p:nvPr>
-        </p:nvSpPr>
-        <p:spPr/>
-        <p:txBody>
-          <a:bodyPr/>
-          <a:lstStyle/>
-          <a:p>
-            <a:fld id="{D17C5EEA-D671-4453-97C7-AF6A67BC87D3}" type="slidenum">
-              <a:rPr lang="en-US" smtClean="0"/>
-              <a:t>22</a:t>
-            </a:fld>
-            <a:endParaRPr lang="en-US"/>
-          </a:p>
-        </p:txBody>
-      </p:sp>
-      <p:sp>
-        <p:nvSpPr>
-          <p:cNvPr id="5" name="TextBox 4">
-            <a:extLst>
-              <a:ext uri="{FF2B5EF4-FFF2-40B4-BE49-F238E27FC236}">
-                <a16:creationId xmlns:a16="http://schemas.microsoft.com/office/drawing/2014/main" id="{534F455F-8016-EFE0-F0BE-3864421D378B}"/>
-              </a:ext>
-            </a:extLst>
-          </p:cNvPr>
-          <p:cNvSpPr txBox="1"/>
-          <p:nvPr/>
-        </p:nvSpPr>
-        <p:spPr>
-          <a:xfrm>
-            <a:off x="0" y="0"/>
-            <a:ext cx="3810000" cy="1270000"/>
-          </a:xfrm>
-          <a:prstGeom prst="rect">
-            <a:avLst/>
-          </a:prstGeom>
-          <a:noFill/>
-        </p:spPr>
-        <p:txBody>
-          <a:bodyPr vert="horz" rtlCol="0">
-            <a:spAutoFit/>
-          </a:bodyPr>
-          <a:lstStyle/>
-          <a:p>
-            <a:endParaRPr lang="en-US"/>
-          </a:p>
-        </p:txBody>
-      </p:sp>
-    </p:spTree>
-    <p:extLst>
-      <p:ext uri="{BB962C8B-B14F-4D97-AF65-F5344CB8AC3E}">
-        <p14:creationId xmlns:p14="http://schemas.microsoft.com/office/powerpoint/2010/main" val="3988574597"/>
-      </p:ext>
-    </p:extLst>
-  </p:cSld>
-  <p:clrMapOvr>
-    <a:masterClrMapping/>
-  </p:clrMapOvr>
-</p:notes>
-</file>
-
-<file path=ppt/notesSlides/notesSlide13.xml><?xml version="1.0" encoding="utf-8"?>
-<p:notes xmlns:a="http://schemas.openxmlformats.org/drawingml/2006/main" xmlns:r="http://schemas.openxmlformats.org/officeDocument/2006/relationships" xmlns:p="http://schemas.openxmlformats.org/presentationml/2006/main">
-  <p:cSld>
-    <p:spTree>
-      <p:nvGrpSpPr>
-        <p:cNvPr id="1" name=""/>
-        <p:cNvGrpSpPr/>
-        <p:nvPr/>
-      </p:nvGrpSpPr>
-      <p:grpSpPr>
-        <a:xfrm>
-          <a:off x="0" y="0"/>
-          <a:ext cx="0" cy="0"/>
-          <a:chOff x="0" y="0"/>
-          <a:chExt cx="0" cy="0"/>
-        </a:xfrm>
-      </p:grpSpPr>
-      <p:sp>
-        <p:nvSpPr>
-          <p:cNvPr id="2" name="Slide Image Placeholder 1"/>
-          <p:cNvSpPr>
-            <a:spLocks noGrp="1" noRot="1" noChangeAspect="1"/>
-          </p:cNvSpPr>
-          <p:nvPr>
-            <p:ph type="sldImg"/>
-          </p:nvPr>
-        </p:nvSpPr>
-        <p:spPr/>
-      </p:sp>
-      <p:sp>
-        <p:nvSpPr>
-          <p:cNvPr id="3" name="Notes Placeholder 2"/>
-          <p:cNvSpPr>
-            <a:spLocks noGrp="1"/>
-          </p:cNvSpPr>
-          <p:nvPr>
-            <p:ph type="body" idx="1"/>
-          </p:nvPr>
-        </p:nvSpPr>
-        <p:spPr/>
-        <p:txBody>
-          <a:bodyPr/>
-          <a:lstStyle/>
-          <a:p>
-            <a:endParaRPr lang="en-US" dirty="0"/>
-          </a:p>
-        </p:txBody>
-      </p:sp>
-      <p:sp>
-        <p:nvSpPr>
-          <p:cNvPr id="4" name="Slide Number Placeholder 3"/>
-          <p:cNvSpPr>
-            <a:spLocks noGrp="1"/>
-          </p:cNvSpPr>
-          <p:nvPr>
-            <p:ph type="sldNum" sz="quarter" idx="5"/>
-          </p:nvPr>
-        </p:nvSpPr>
-        <p:spPr/>
-        <p:txBody>
-          <a:bodyPr/>
-          <a:lstStyle/>
-          <a:p>
-            <a:fld id="{D17C5EEA-D671-4453-97C7-AF6A67BC87D3}" type="slidenum">
-              <a:rPr lang="en-US" smtClean="0"/>
-              <a:t>27</a:t>
-            </a:fld>
-            <a:endParaRPr lang="en-US"/>
-          </a:p>
-        </p:txBody>
-      </p:sp>
-    </p:spTree>
-    <p:extLst>
-      <p:ext uri="{BB962C8B-B14F-4D97-AF65-F5344CB8AC3E}">
-        <p14:creationId xmlns:p14="http://schemas.microsoft.com/office/powerpoint/2010/main" val="2104214148"/>
-      </p:ext>
-    </p:extLst>
-  </p:cSld>
-  <p:clrMapOvr>
-    <a:masterClrMapping/>
-  </p:clrMapOvr>
-</p:notes>
-</file>
-
-<file path=ppt/notesSlides/notesSlide14.xml><?xml version="1.0" encoding="utf-8"?>
-<p:notes xmlns:a="http://schemas.openxmlformats.org/drawingml/2006/main" xmlns:r="http://schemas.openxmlformats.org/officeDocument/2006/relationships" xmlns:p="http://schemas.openxmlformats.org/presentationml/2006/main">
-  <p:cSld>
-    <p:spTree>
-      <p:nvGrpSpPr>
-        <p:cNvPr id="1" name=""/>
-        <p:cNvGrpSpPr/>
-        <p:nvPr/>
-      </p:nvGrpSpPr>
-      <p:grpSpPr>
-        <a:xfrm>
-          <a:off x="0" y="0"/>
-          <a:ext cx="0" cy="0"/>
-          <a:chOff x="0" y="0"/>
-          <a:chExt cx="0" cy="0"/>
-        </a:xfrm>
-      </p:grpSpPr>
-      <p:sp>
-        <p:nvSpPr>
-          <p:cNvPr id="2" name="Slide Image Placeholder 1"/>
-          <p:cNvSpPr>
-            <a:spLocks noGrp="1" noRot="1" noChangeAspect="1"/>
-          </p:cNvSpPr>
-          <p:nvPr>
-            <p:ph type="sldImg"/>
-          </p:nvPr>
-        </p:nvSpPr>
-        <p:spPr/>
-      </p:sp>
-      <p:sp>
-        <p:nvSpPr>
-          <p:cNvPr id="3" name="Notes Placeholder 2"/>
-          <p:cNvSpPr>
-            <a:spLocks noGrp="1"/>
-          </p:cNvSpPr>
-          <p:nvPr>
-            <p:ph type="body" idx="1"/>
-          </p:nvPr>
-        </p:nvSpPr>
-        <p:spPr/>
-        <p:txBody>
-          <a:bodyPr/>
-          <a:lstStyle/>
-          <a:p>
-            <a:endParaRPr lang="en-US" dirty="0"/>
-          </a:p>
-        </p:txBody>
-      </p:sp>
-      <p:sp>
-        <p:nvSpPr>
-          <p:cNvPr id="4" name="Slide Number Placeholder 3"/>
-          <p:cNvSpPr>
-            <a:spLocks noGrp="1"/>
-          </p:cNvSpPr>
-          <p:nvPr>
-            <p:ph type="sldNum" sz="quarter" idx="5"/>
-          </p:nvPr>
-        </p:nvSpPr>
-        <p:spPr/>
-        <p:txBody>
-          <a:bodyPr/>
-          <a:lstStyle/>
-          <a:p>
-            <a:fld id="{D17C5EEA-D671-4453-97C7-AF6A67BC87D3}" type="slidenum">
-              <a:rPr lang="en-US" smtClean="0"/>
-              <a:t>29</a:t>
-            </a:fld>
-            <a:endParaRPr lang="en-US"/>
-          </a:p>
-        </p:txBody>
-      </p:sp>
-    </p:spTree>
-    <p:extLst>
-      <p:ext uri="{BB962C8B-B14F-4D97-AF65-F5344CB8AC3E}">
-        <p14:creationId xmlns:p14="http://schemas.microsoft.com/office/powerpoint/2010/main" val="2696141313"/>
-      </p:ext>
-    </p:extLst>
-  </p:cSld>
-  <p:clrMapOvr>
-    <a:masterClrMapping/>
-  </p:clrMapOvr>
-</p:notes>
-</file>
-
-<file path=ppt/notesSlides/notesSlide15.xml><?xml version="1.0" encoding="utf-8"?>
-<p:notes xmlns:a="http://schemas.openxmlformats.org/drawingml/2006/main" xmlns:r="http://schemas.openxmlformats.org/officeDocument/2006/relationships" xmlns:p="http://schemas.openxmlformats.org/presentationml/2006/main">
-  <p:cSld>
-    <p:spTree>
-      <p:nvGrpSpPr>
-        <p:cNvPr id="1" name=""/>
-        <p:cNvGrpSpPr/>
-        <p:nvPr/>
-      </p:nvGrpSpPr>
-      <p:grpSpPr>
-        <a:xfrm>
-          <a:off x="0" y="0"/>
-          <a:ext cx="0" cy="0"/>
-          <a:chOff x="0" y="0"/>
-          <a:chExt cx="0" cy="0"/>
-        </a:xfrm>
-      </p:grpSpPr>
-      <p:sp>
-        <p:nvSpPr>
-          <p:cNvPr id="2" name="Slide Image Placeholder 1"/>
-          <p:cNvSpPr>
-            <a:spLocks noGrp="1" noRot="1" noChangeAspect="1"/>
-          </p:cNvSpPr>
-          <p:nvPr>
-            <p:ph type="sldImg"/>
-          </p:nvPr>
-        </p:nvSpPr>
-        <p:spPr/>
-      </p:sp>
-      <p:sp>
-        <p:nvSpPr>
-          <p:cNvPr id="3" name="Notes Placeholder 2"/>
-          <p:cNvSpPr>
-            <a:spLocks noGrp="1"/>
-          </p:cNvSpPr>
-          <p:nvPr>
-            <p:ph type="body" idx="1"/>
-          </p:nvPr>
-        </p:nvSpPr>
-        <p:spPr/>
-        <p:txBody>
-          <a:bodyPr/>
-          <a:lstStyle/>
-          <a:p>
-            <a:endParaRPr lang="en-US" dirty="0"/>
-          </a:p>
-        </p:txBody>
-      </p:sp>
-      <p:sp>
-        <p:nvSpPr>
-          <p:cNvPr id="4" name="Slide Number Placeholder 3"/>
-          <p:cNvSpPr>
-            <a:spLocks noGrp="1"/>
-          </p:cNvSpPr>
-          <p:nvPr>
-            <p:ph type="sldNum" sz="quarter" idx="5"/>
-          </p:nvPr>
-        </p:nvSpPr>
-        <p:spPr/>
-        <p:txBody>
-          <a:bodyPr/>
-          <a:lstStyle/>
-          <a:p>
-            <a:fld id="{D17C5EEA-D671-4453-97C7-AF6A67BC87D3}" type="slidenum">
-              <a:rPr lang="en-US" smtClean="0"/>
-              <a:t>34</a:t>
-            </a:fld>
-            <a:endParaRPr lang="en-US"/>
-          </a:p>
-        </p:txBody>
-      </p:sp>
-    </p:spTree>
-    <p:extLst>
-      <p:ext uri="{BB962C8B-B14F-4D97-AF65-F5344CB8AC3E}">
-        <p14:creationId xmlns:p14="http://schemas.microsoft.com/office/powerpoint/2010/main" val="294387586"/>
-      </p:ext>
-    </p:extLst>
-  </p:cSld>
-  <p:clrMapOvr>
-    <a:masterClrMapping/>
-  </p:clrMapOvr>
-</p:notes>
-</file>
-
 <file path=ppt/notesSlides/notesSlide2.xml><?xml version="1.0" encoding="utf-8"?>
 <p:notes xmlns:a="http://schemas.openxmlformats.org/drawingml/2006/main" xmlns:r="http://schemas.openxmlformats.org/officeDocument/2006/relationships" xmlns:p="http://schemas.openxmlformats.org/presentationml/2006/main">
   <p:cSld>
@@ -1582,14 +954,7 @@
           <a:bodyPr/>
           <a:lstStyle/>
           <a:p>
-            <a:r>
-              <a:rPr lang="en-US"/>
-              <a:t>
-Poll Title: Do not modify the notes in this section to avoid tampering with the Poll Everywhere activity.
-More info at polleverywhere.com/support
-CS2100 Tutorial 1 Number Systems
-https://www.polleverywhere.com/surveys/Ftj7T59516hSpGx6ZHgLq?display_state=chart&amp;activity_state=opened&amp;state=opened&amp;flow=Engagement&amp;onscreen=persist</a:t>
-            </a:r>
+            <a:endParaRPr lang="en-US" dirty="0"/>
           </a:p>
         </p:txBody>
       </p:sp>
@@ -1610,40 +975,8 @@
           <a:p>
             <a:fld id="{D17C5EEA-D671-4453-97C7-AF6A67BC87D3}" type="slidenum">
               <a:rPr lang="en-US" smtClean="0"/>
-              <a:t>13</a:t>
+              <a:t>20</a:t>
             </a:fld>
-            <a:endParaRPr lang="en-US"/>
-          </a:p>
-        </p:txBody>
-      </p:sp>
-      <p:sp>
-        <p:nvSpPr>
-          <p:cNvPr id="5" name="TextBox 4">
-            <a:extLst>
-              <a:ext uri="{FF2B5EF4-FFF2-40B4-BE49-F238E27FC236}">
-                <a16:creationId xmlns:a16="http://schemas.microsoft.com/office/drawing/2014/main" id="{1C548E16-D652-EDE8-6220-F748E3038AC7}"/>
-              </a:ext>
-            </a:extLst>
-          </p:cNvPr>
-          <p:cNvSpPr txBox="1"/>
-          <p:nvPr/>
-        </p:nvSpPr>
-        <p:spPr>
-          <a:xfrm>
-            <a:off x="0" y="0"/>
-            <a:ext cx="3810000" cy="1270000"/>
-          </a:xfrm>
-          <a:prstGeom prst="rect">
-            <a:avLst/>
-          </a:prstGeom>
-          <a:noFill/>
-        </p:spPr>
-        <p:txBody>
-          <a:bodyPr vert="horz" rtlCol="0">
-            <a:spAutoFit/>
-          </a:bodyPr>
-          <a:lstStyle/>
-          <a:p>
             <a:endParaRPr lang="en-US"/>
           </a:p>
         </p:txBody>
@@ -1651,7 +984,7 @@
     </p:spTree>
     <p:extLst>
       <p:ext uri="{BB962C8B-B14F-4D97-AF65-F5344CB8AC3E}">
-        <p14:creationId xmlns:p14="http://schemas.microsoft.com/office/powerpoint/2010/main" val="1509046918"/>
+        <p14:creationId xmlns:p14="http://schemas.microsoft.com/office/powerpoint/2010/main" val="2104214148"/>
       </p:ext>
     </p:extLst>
   </p:cSld>
@@ -1705,14 +1038,7 @@
           <a:bodyPr/>
           <a:lstStyle/>
           <a:p>
-            <a:r>
-              <a:rPr lang="en-US"/>
-              <a:t>
-Poll Title: Do not modify the notes in this section to avoid tampering with the Poll Everywhere activity.
-More info at polleverywhere.com/support
-If you have 6 bits to represent a number in unsigned integer, how many numbers can you represent?
-https://www.polleverywhere.com/multiple_choice_polls/euhEBtKapIwtIfEPCh6Gz?display_state=chart&amp;activity_state=opened&amp;state=opened&amp;flow=Engagement&amp;onscreen=persist&amp;hide=instructions</a:t>
-            </a:r>
+            <a:endParaRPr lang="en-US" dirty="0"/>
           </a:p>
         </p:txBody>
       </p:sp>
@@ -1733,40 +1059,8 @@
           <a:p>
             <a:fld id="{D17C5EEA-D671-4453-97C7-AF6A67BC87D3}" type="slidenum">
               <a:rPr lang="en-US" smtClean="0"/>
-              <a:t>14</a:t>
+              <a:t>22</a:t>
             </a:fld>
-            <a:endParaRPr lang="en-US"/>
-          </a:p>
-        </p:txBody>
-      </p:sp>
-      <p:sp>
-        <p:nvSpPr>
-          <p:cNvPr id="5" name="TextBox 4">
-            <a:extLst>
-              <a:ext uri="{FF2B5EF4-FFF2-40B4-BE49-F238E27FC236}">
-                <a16:creationId xmlns:a16="http://schemas.microsoft.com/office/drawing/2014/main" id="{9C42CAD0-F3A1-331D-9E3E-EA6B2D176142}"/>
-              </a:ext>
-            </a:extLst>
-          </p:cNvPr>
-          <p:cNvSpPr txBox="1"/>
-          <p:nvPr/>
-        </p:nvSpPr>
-        <p:spPr>
-          <a:xfrm>
-            <a:off x="0" y="0"/>
-            <a:ext cx="3810000" cy="1270000"/>
-          </a:xfrm>
-          <a:prstGeom prst="rect">
-            <a:avLst/>
-          </a:prstGeom>
-          <a:noFill/>
-        </p:spPr>
-        <p:txBody>
-          <a:bodyPr vert="horz" rtlCol="0">
-            <a:spAutoFit/>
-          </a:bodyPr>
-          <a:lstStyle/>
-          <a:p>
             <a:endParaRPr lang="en-US"/>
           </a:p>
         </p:txBody>
@@ -1774,7 +1068,7 @@
     </p:spTree>
     <p:extLst>
       <p:ext uri="{BB962C8B-B14F-4D97-AF65-F5344CB8AC3E}">
-        <p14:creationId xmlns:p14="http://schemas.microsoft.com/office/powerpoint/2010/main" val="1715064525"/>
+        <p14:creationId xmlns:p14="http://schemas.microsoft.com/office/powerpoint/2010/main" val="2696141313"/>
       </p:ext>
     </p:extLst>
   </p:cSld>
@@ -1828,14 +1122,7 @@
           <a:bodyPr/>
           <a:lstStyle/>
           <a:p>
-            <a:r>
-              <a:rPr lang="en-US"/>
-              <a:t>
-Poll Title: Do not modify the notes in this section to avoid tampering with the Poll Everywhere activity.
-More info at polleverywhere.com/support
-If you have 6 bits to represent a number in 1s complement, how many numbers can you represent?
-https://www.polleverywhere.com/multiple_choice_polls/wp6rHDU70XfkHMUAMqEzX?display_state=chart&amp;activity_state=opened&amp;state=opened&amp;flow=Engagement&amp;onscreen=persist&amp;hide=instructions</a:t>
-            </a:r>
+            <a:endParaRPr lang="en-US" dirty="0"/>
           </a:p>
         </p:txBody>
       </p:sp>
@@ -1856,40 +1143,8 @@
           <a:p>
             <a:fld id="{D17C5EEA-D671-4453-97C7-AF6A67BC87D3}" type="slidenum">
               <a:rPr lang="en-US" smtClean="0"/>
-              <a:t>15</a:t>
+              <a:t>27</a:t>
             </a:fld>
-            <a:endParaRPr lang="en-US"/>
-          </a:p>
-        </p:txBody>
-      </p:sp>
-      <p:sp>
-        <p:nvSpPr>
-          <p:cNvPr id="5" name="TextBox 4">
-            <a:extLst>
-              <a:ext uri="{FF2B5EF4-FFF2-40B4-BE49-F238E27FC236}">
-                <a16:creationId xmlns:a16="http://schemas.microsoft.com/office/drawing/2014/main" id="{0DD1F562-0FB0-95F6-AEC8-D0F61FD9533E}"/>
-              </a:ext>
-            </a:extLst>
-          </p:cNvPr>
-          <p:cNvSpPr txBox="1"/>
-          <p:nvPr/>
-        </p:nvSpPr>
-        <p:spPr>
-          <a:xfrm>
-            <a:off x="0" y="0"/>
-            <a:ext cx="3810000" cy="1270000"/>
-          </a:xfrm>
-          <a:prstGeom prst="rect">
-            <a:avLst/>
-          </a:prstGeom>
-          <a:noFill/>
-        </p:spPr>
-        <p:txBody>
-          <a:bodyPr vert="horz" rtlCol="0">
-            <a:spAutoFit/>
-          </a:bodyPr>
-          <a:lstStyle/>
-          <a:p>
             <a:endParaRPr lang="en-US"/>
           </a:p>
         </p:txBody>
@@ -1897,130 +1152,7 @@
     </p:spTree>
     <p:extLst>
       <p:ext uri="{BB962C8B-B14F-4D97-AF65-F5344CB8AC3E}">
-        <p14:creationId xmlns:p14="http://schemas.microsoft.com/office/powerpoint/2010/main" val="2102299740"/>
-      </p:ext>
-    </p:extLst>
-  </p:cSld>
-  <p:clrMapOvr>
-    <a:masterClrMapping/>
-  </p:clrMapOvr>
-</p:notes>
-</file>
-
-<file path=ppt/notesSlides/notesSlide9.xml><?xml version="1.0" encoding="utf-8"?>
-<p:notes xmlns:a="http://schemas.openxmlformats.org/drawingml/2006/main" xmlns:r="http://schemas.openxmlformats.org/officeDocument/2006/relationships" xmlns:p="http://schemas.openxmlformats.org/presentationml/2006/main">
-  <p:cSld>
-    <p:spTree>
-      <p:nvGrpSpPr>
-        <p:cNvPr id="1" name=""/>
-        <p:cNvGrpSpPr/>
-        <p:nvPr/>
-      </p:nvGrpSpPr>
-      <p:grpSpPr>
-        <a:xfrm>
-          <a:off x="0" y="0"/>
-          <a:ext cx="0" cy="0"/>
-          <a:chOff x="0" y="0"/>
-          <a:chExt cx="0" cy="0"/>
-        </a:xfrm>
-      </p:grpSpPr>
-      <p:sp>
-        <p:nvSpPr>
-          <p:cNvPr id="2" name="Slide Image Placeholder 1"/>
-          <p:cNvSpPr>
-            <a:spLocks noGrp="1" noRot="1" noChangeAspect="1"/>
-          </p:cNvSpPr>
-          <p:nvPr>
-            <p:ph type="sldImg"/>
-          </p:nvPr>
-        </p:nvSpPr>
-        <p:spPr/>
-      </p:sp>
-      <p:sp>
-        <p:nvSpPr>
-          <p:cNvPr id="3" name="Notes Placeholder 2"/>
-          <p:cNvSpPr>
-            <a:spLocks noGrp="1"/>
-          </p:cNvSpPr>
-          <p:nvPr>
-            <p:ph type="body" idx="1"/>
-          </p:nvPr>
-        </p:nvSpPr>
-        <p:spPr/>
-        <p:txBody>
-          <a:bodyPr/>
-          <a:lstStyle/>
-          <a:p>
-            <a:r>
-              <a:rPr lang="en-US"/>
-              <a:t>
-Poll Title: Do not modify the notes in this section to avoid tampering with the Poll Everywhere activity.
-More info at polleverywhere.com/support
-If you have 6 bits to represent a number in 2s complement, how many number can you represent?
-https://www.polleverywhere.com/multiple_choice_polls/nPie9wc8Afj76PTxH2Zdk?display_state=chart&amp;activity_state=opened&amp;state=opened&amp;flow=Engagement&amp;onscreen=persist&amp;hide=instructions</a:t>
-            </a:r>
-          </a:p>
-        </p:txBody>
-      </p:sp>
-      <p:sp>
-        <p:nvSpPr>
-          <p:cNvPr id="4" name="Slide Number Placeholder 3"/>
-          <p:cNvSpPr>
-            <a:spLocks noGrp="1"/>
-          </p:cNvSpPr>
-          <p:nvPr>
-            <p:ph type="sldNum" sz="quarter" idx="5"/>
-          </p:nvPr>
-        </p:nvSpPr>
-        <p:spPr/>
-        <p:txBody>
-          <a:bodyPr/>
-          <a:lstStyle/>
-          <a:p>
-            <a:fld id="{D17C5EEA-D671-4453-97C7-AF6A67BC87D3}" type="slidenum">
-              <a:rPr lang="en-US" smtClean="0"/>
-              <a:t>16</a:t>
-            </a:fld>
-            <a:endParaRPr lang="en-US"/>
-          </a:p>
-        </p:txBody>
-      </p:sp>
-      <p:sp>
-        <p:nvSpPr>
-          <p:cNvPr id="5" name="TextBox 4">
-            <a:extLst>
-              <a:ext uri="{FF2B5EF4-FFF2-40B4-BE49-F238E27FC236}">
-                <a16:creationId xmlns:a16="http://schemas.microsoft.com/office/drawing/2014/main" id="{228045CA-DC11-FF6A-8A2F-480167DDC589}"/>
-              </a:ext>
-            </a:extLst>
-          </p:cNvPr>
-          <p:cNvSpPr txBox="1"/>
-          <p:nvPr/>
-        </p:nvSpPr>
-        <p:spPr>
-          <a:xfrm>
-            <a:off x="0" y="0"/>
-            <a:ext cx="3810000" cy="1270000"/>
-          </a:xfrm>
-          <a:prstGeom prst="rect">
-            <a:avLst/>
-          </a:prstGeom>
-          <a:noFill/>
-        </p:spPr>
-        <p:txBody>
-          <a:bodyPr vert="horz" rtlCol="0">
-            <a:spAutoFit/>
-          </a:bodyPr>
-          <a:lstStyle/>
-          <a:p>
-            <a:endParaRPr lang="en-US"/>
-          </a:p>
-        </p:txBody>
-      </p:sp>
-    </p:spTree>
-    <p:extLst>
-      <p:ext uri="{BB962C8B-B14F-4D97-AF65-F5344CB8AC3E}">
-        <p14:creationId xmlns:p14="http://schemas.microsoft.com/office/powerpoint/2010/main" val="3747389815"/>
+        <p14:creationId xmlns:p14="http://schemas.microsoft.com/office/powerpoint/2010/main" val="294387586"/>
       </p:ext>
     </p:extLst>
   </p:cSld>
@@ -2181,7 +1313,7 @@
           <a:p>
             <a:fld id="{6CCF18BA-79E2-4428-BC0A-399EA0551CA6}" type="datetimeFigureOut">
               <a:rPr lang="en-US" smtClean="0"/>
-              <a:t>8/26/2024</a:t>
+              <a:t>9/1/2024</a:t>
             </a:fld>
             <a:endParaRPr lang="en-US"/>
           </a:p>
@@ -2411,7 +1543,7 @@
           <a:p>
             <a:fld id="{6CCF18BA-79E2-4428-BC0A-399EA0551CA6}" type="datetimeFigureOut">
               <a:rPr lang="en-US" smtClean="0"/>
-              <a:t>8/26/2024</a:t>
+              <a:t>9/1/2024</a:t>
             </a:fld>
             <a:endParaRPr lang="en-US"/>
           </a:p>
@@ -2651,7 +1783,7 @@
           <a:p>
             <a:fld id="{6CCF18BA-79E2-4428-BC0A-399EA0551CA6}" type="datetimeFigureOut">
               <a:rPr lang="en-US" smtClean="0"/>
-              <a:t>8/26/2024</a:t>
+              <a:t>9/1/2024</a:t>
             </a:fld>
             <a:endParaRPr lang="en-US"/>
           </a:p>
@@ -2881,7 +2013,7 @@
           <a:p>
             <a:fld id="{6CCF18BA-79E2-4428-BC0A-399EA0551CA6}" type="datetimeFigureOut">
               <a:rPr lang="en-US" smtClean="0"/>
-              <a:t>8/26/2024</a:t>
+              <a:t>9/1/2024</a:t>
             </a:fld>
             <a:endParaRPr lang="en-US"/>
           </a:p>
@@ -3159,7 +2291,7 @@
           <a:p>
             <a:fld id="{6CCF18BA-79E2-4428-BC0A-399EA0551CA6}" type="datetimeFigureOut">
               <a:rPr lang="en-US" smtClean="0"/>
-              <a:t>8/26/2024</a:t>
+              <a:t>9/1/2024</a:t>
             </a:fld>
             <a:endParaRPr lang="en-US"/>
           </a:p>
@@ -3482,7 +2614,7 @@
           <a:p>
             <a:fld id="{6CCF18BA-79E2-4428-BC0A-399EA0551CA6}" type="datetimeFigureOut">
               <a:rPr lang="en-US" smtClean="0"/>
-              <a:t>8/26/2024</a:t>
+              <a:t>9/1/2024</a:t>
             </a:fld>
             <a:endParaRPr lang="en-US"/>
           </a:p>
@@ -3956,7 +3088,7 @@
           <a:p>
             <a:fld id="{6CCF18BA-79E2-4428-BC0A-399EA0551CA6}" type="datetimeFigureOut">
               <a:rPr lang="en-US" smtClean="0"/>
-              <a:t>8/26/2024</a:t>
+              <a:t>9/1/2024</a:t>
             </a:fld>
             <a:endParaRPr lang="en-US"/>
           </a:p>
@@ -4103,7 +3235,7 @@
           <a:p>
             <a:fld id="{6CCF18BA-79E2-4428-BC0A-399EA0551CA6}" type="datetimeFigureOut">
               <a:rPr lang="en-US" smtClean="0"/>
-              <a:t>8/26/2024</a:t>
+              <a:t>9/1/2024</a:t>
             </a:fld>
             <a:endParaRPr lang="en-US"/>
           </a:p>
@@ -4216,7 +3348,7 @@
           <a:p>
             <a:fld id="{6CCF18BA-79E2-4428-BC0A-399EA0551CA6}" type="datetimeFigureOut">
               <a:rPr lang="en-US" smtClean="0"/>
-              <a:t>8/26/2024</a:t>
+              <a:t>9/1/2024</a:t>
             </a:fld>
             <a:endParaRPr lang="en-US"/>
           </a:p>
@@ -4541,7 +3673,7 @@
           <a:p>
             <a:fld id="{6CCF18BA-79E2-4428-BC0A-399EA0551CA6}" type="datetimeFigureOut">
               <a:rPr lang="en-US" smtClean="0"/>
-              <a:t>8/26/2024</a:t>
+              <a:t>9/1/2024</a:t>
             </a:fld>
             <a:endParaRPr lang="en-US"/>
           </a:p>
@@ -4833,7 +3965,7 @@
           <a:p>
             <a:fld id="{6CCF18BA-79E2-4428-BC0A-399EA0551CA6}" type="datetimeFigureOut">
               <a:rPr lang="en-US" smtClean="0"/>
-              <a:t>8/26/2024</a:t>
+              <a:t>9/1/2024</a:t>
             </a:fld>
             <a:endParaRPr lang="en-US"/>
           </a:p>
@@ -5074,7 +4206,7 @@
           <a:p>
             <a:fld id="{6CCF18BA-79E2-4428-BC0A-399EA0551CA6}" type="datetimeFigureOut">
               <a:rPr lang="en-US" smtClean="0"/>
-              <a:t>8/26/2024</a:t>
+              <a:t>9/1/2024</a:t>
             </a:fld>
             <a:endParaRPr lang="en-US"/>
           </a:p>
@@ -5547,8 +4679,27 @@
               <a:rPr lang="en-US" dirty="0">
                 <a:latin typeface="AndesNeue Alt 2 Book" panose="00000500000000000000" pitchFamily="2" charset="0"/>
               </a:rPr>
-              <a:t>C and Number Systems</a:t>
-            </a:r>
+              <a:t>C and </a:t>
+            </a:r>
+            <a:r>
+              <a:rPr lang="en-US">
+                <a:latin typeface="AndesNeue Alt 2 Book" panose="00000500000000000000" pitchFamily="2" charset="0"/>
+              </a:rPr>
+              <a:t>Number Systems</a:t>
+            </a:r>
+            <a:br>
+              <a:rPr lang="en-US">
+                <a:latin typeface="AndesNeue Alt 2 Book" panose="00000500000000000000" pitchFamily="2" charset="0"/>
+              </a:rPr>
+            </a:br>
+            <a:br>
+              <a:rPr lang="en-US">
+                <a:latin typeface="AndesNeue Alt 2 Book" panose="00000500000000000000" pitchFamily="2" charset="0"/>
+              </a:rPr>
+            </a:br>
+            <a:endParaRPr lang="en-US" dirty="0">
+              <a:latin typeface="AndesNeue Alt 2 Book" panose="00000500000000000000" pitchFamily="2" charset="0"/>
+            </a:endParaRPr>
           </a:p>
         </p:txBody>
       </p:sp>
@@ -6011,50 +5162,140 @@
           <a:chExt cx="0" cy="0"/>
         </a:xfrm>
       </p:grpSpPr>
-      <p:pic>
-        <p:nvPicPr>
-          <p:cNvPr id="3" name="Picture 2">
-            <a:extLst>
-              <a:ext uri="{FF2B5EF4-FFF2-40B4-BE49-F238E27FC236}">
-                <a16:creationId xmlns:a16="http://schemas.microsoft.com/office/drawing/2014/main" id="{AEE53513-E7AF-2C6E-9106-05422F63947C}"/>
-              </a:ext>
-            </a:extLst>
-          </p:cNvPr>
-          <p:cNvPicPr>
-            <a:picLocks/>
-          </p:cNvPicPr>
+      <p:sp>
+        <p:nvSpPr>
+          <p:cNvPr id="2" name="Title 1">
+            <a:extLst>
+              <a:ext uri="{FF2B5EF4-FFF2-40B4-BE49-F238E27FC236}">
+                <a16:creationId xmlns:a16="http://schemas.microsoft.com/office/drawing/2014/main" id="{4BB0EE00-9385-92E3-0B23-214EA83A115F}"/>
+              </a:ext>
+            </a:extLst>
+          </p:cNvPr>
+          <p:cNvSpPr>
+            <a:spLocks noGrp="1"/>
+          </p:cNvSpPr>
           <p:nvPr>
-            <p:custDataLst>
-              <p:tags r:id="rId1"/>
-            </p:custDataLst>
+            <p:ph type="title"/>
           </p:nvPr>
-        </p:nvPicPr>
-        <p:blipFill>
-          <a:blip r:embed="rId4">
-            <a:extLst>
-              <a:ext uri="{28A0092B-C50C-407E-A947-70E740481C1C}">
-                <a14:useLocalDpi xmlns:a14="http://schemas.microsoft.com/office/drawing/2010/main" val="0"/>
-              </a:ext>
-            </a:extLst>
-          </a:blip>
-          <a:stretch>
-            <a:fillRect/>
-          </a:stretch>
-        </p:blipFill>
+        </p:nvSpPr>
+        <p:spPr/>
+        <p:txBody>
+          <a:bodyPr/>
+          <a:lstStyle/>
+          <a:p>
+            <a:r>
+              <a:rPr lang="en-US" dirty="0"/>
+              <a:t>Unsigned, 1s complement, 2s complement</a:t>
+            </a:r>
+          </a:p>
+        </p:txBody>
+      </p:sp>
+      <p:sp>
+        <p:nvSpPr>
+          <p:cNvPr id="3" name="Content Placeholder 2">
+            <a:extLst>
+              <a:ext uri="{FF2B5EF4-FFF2-40B4-BE49-F238E27FC236}">
+                <a16:creationId xmlns:a16="http://schemas.microsoft.com/office/drawing/2014/main" id="{AA04C9A6-09D5-1232-D89A-815F78419C61}"/>
+              </a:ext>
+            </a:extLst>
+          </p:cNvPr>
+          <p:cNvSpPr>
+            <a:spLocks noGrp="1"/>
+          </p:cNvSpPr>
+          <p:nvPr>
+            <p:ph idx="1"/>
+          </p:nvPr>
+        </p:nvSpPr>
         <p:spPr>
           <a:xfrm>
-            <a:off x="190500" y="190500"/>
-            <a:ext cx="11811000" cy="6477000"/>
+            <a:off x="838200" y="1825625"/>
+            <a:ext cx="10515600" cy="4351338"/>
           </a:xfrm>
-          <a:prstGeom prst="rect">
-            <a:avLst/>
-          </a:prstGeom>
         </p:spPr>
-      </p:pic>
+        <p:txBody>
+          <a:bodyPr/>
+          <a:lstStyle/>
+          <a:p>
+            <a:r>
+              <a:rPr lang="en-US" dirty="0"/>
+              <a:t>Two ways </a:t>
+            </a:r>
+            <a:r>
+              <a:rPr lang="en-US"/>
+              <a:t>of seeing </a:t>
+            </a:r>
+            <a:r>
+              <a:rPr lang="en-US" dirty="0"/>
+              <a:t>n-bit </a:t>
+            </a:r>
+            <a:r>
+              <a:rPr lang="en-US"/>
+              <a:t>1’s complement integers:</a:t>
+            </a:r>
+            <a:endParaRPr lang="en-US" dirty="0"/>
+          </a:p>
+          <a:p>
+            <a:pPr marL="914400" lvl="1" indent="-457200">
+              <a:buFont typeface="+mj-lt"/>
+              <a:buAutoNum type="arabicPeriod"/>
+            </a:pPr>
+            <a:r>
+              <a:rPr lang="en-US" dirty="0"/>
+              <a:t>If the MSB is 1, it’s negative. Flip the rest of the bits to get the number</a:t>
+            </a:r>
+          </a:p>
+          <a:p>
+            <a:pPr marL="914400" lvl="1" indent="-457200">
+              <a:buFont typeface="+mj-lt"/>
+              <a:buAutoNum type="arabicPeriod"/>
+            </a:pPr>
+            <a:r>
+              <a:rPr lang="en-US" dirty="0"/>
+              <a:t>The MSB has a value of –(2</a:t>
+            </a:r>
+            <a:r>
+              <a:rPr lang="en-US" baseline="30000" dirty="0"/>
+              <a:t>n-1</a:t>
+            </a:r>
+            <a:r>
+              <a:rPr lang="en-US" dirty="0"/>
+              <a:t> – 1), the rest goes as usual</a:t>
+            </a:r>
+          </a:p>
+          <a:p>
+            <a:pPr marL="0" indent="0">
+              <a:buNone/>
+            </a:pPr>
+            <a:endParaRPr lang="en-US" dirty="0"/>
+          </a:p>
+          <a:p>
+            <a:pPr marL="0" indent="0">
+              <a:buNone/>
+            </a:pPr>
+            <a:r>
+              <a:rPr lang="en-US" dirty="0"/>
+              <a:t>Example: 4-bit 1’s complement</a:t>
+            </a:r>
+          </a:p>
+          <a:p>
+            <a:pPr marL="0" indent="0">
+              <a:buNone/>
+            </a:pPr>
+            <a:r>
+              <a:rPr lang="en-US" dirty="0"/>
+              <a:t>(1101)</a:t>
+            </a:r>
+            <a:r>
+              <a:rPr lang="en-US" baseline="-25000" dirty="0"/>
+              <a:t>1s</a:t>
+            </a:r>
+          </a:p>
+        </p:txBody>
+      </p:sp>
     </p:spTree>
     <p:extLst>
       <p:ext uri="{BB962C8B-B14F-4D97-AF65-F5344CB8AC3E}">
-        <p14:creationId xmlns:p14="http://schemas.microsoft.com/office/powerpoint/2010/main" val="3045189057"/>
+        <p14:creationId xmlns:p14="http://schemas.microsoft.com/office/powerpoint/2010/main" val="2487549993"/>
       </p:ext>
     </p:extLst>
   </p:cSld>
@@ -6081,50 +5322,139 @@
           <a:chExt cx="0" cy="0"/>
         </a:xfrm>
       </p:grpSpPr>
-      <p:pic>
-        <p:nvPicPr>
-          <p:cNvPr id="3" name="Picture 2">
-            <a:extLst>
-              <a:ext uri="{FF2B5EF4-FFF2-40B4-BE49-F238E27FC236}">
-                <a16:creationId xmlns:a16="http://schemas.microsoft.com/office/drawing/2014/main" id="{C70C57A9-1A53-5BCD-7188-DC16D59CC417}"/>
-              </a:ext>
-            </a:extLst>
-          </p:cNvPr>
-          <p:cNvPicPr>
-            <a:picLocks/>
-          </p:cNvPicPr>
+      <p:sp>
+        <p:nvSpPr>
+          <p:cNvPr id="2" name="Title 1">
+            <a:extLst>
+              <a:ext uri="{FF2B5EF4-FFF2-40B4-BE49-F238E27FC236}">
+                <a16:creationId xmlns:a16="http://schemas.microsoft.com/office/drawing/2014/main" id="{4BB0EE00-9385-92E3-0B23-214EA83A115F}"/>
+              </a:ext>
+            </a:extLst>
+          </p:cNvPr>
+          <p:cNvSpPr>
+            <a:spLocks noGrp="1"/>
+          </p:cNvSpPr>
           <p:nvPr>
-            <p:custDataLst>
-              <p:tags r:id="rId1"/>
-            </p:custDataLst>
+            <p:ph type="title"/>
           </p:nvPr>
-        </p:nvPicPr>
-        <p:blipFill>
-          <a:blip r:embed="rId4">
-            <a:extLst>
-              <a:ext uri="{28A0092B-C50C-407E-A947-70E740481C1C}">
-                <a14:useLocalDpi xmlns:a14="http://schemas.microsoft.com/office/drawing/2010/main" val="0"/>
-              </a:ext>
-            </a:extLst>
-          </a:blip>
-          <a:stretch>
-            <a:fillRect/>
-          </a:stretch>
-        </p:blipFill>
+        </p:nvSpPr>
+        <p:spPr/>
+        <p:txBody>
+          <a:bodyPr/>
+          <a:lstStyle/>
+          <a:p>
+            <a:r>
+              <a:rPr lang="en-US" dirty="0"/>
+              <a:t>Unsigned, 1s complement, 2s complement</a:t>
+            </a:r>
+          </a:p>
+        </p:txBody>
+      </p:sp>
+      <p:sp>
+        <p:nvSpPr>
+          <p:cNvPr id="3" name="Content Placeholder 2">
+            <a:extLst>
+              <a:ext uri="{FF2B5EF4-FFF2-40B4-BE49-F238E27FC236}">
+                <a16:creationId xmlns:a16="http://schemas.microsoft.com/office/drawing/2014/main" id="{AA04C9A6-09D5-1232-D89A-815F78419C61}"/>
+              </a:ext>
+            </a:extLst>
+          </p:cNvPr>
+          <p:cNvSpPr>
+            <a:spLocks noGrp="1"/>
+          </p:cNvSpPr>
+          <p:nvPr>
+            <p:ph idx="1"/>
+          </p:nvPr>
+        </p:nvSpPr>
         <p:spPr>
           <a:xfrm>
-            <a:off x="190500" y="190500"/>
-            <a:ext cx="11811000" cy="6477000"/>
+            <a:off x="838200" y="1825625"/>
+            <a:ext cx="10515600" cy="4351338"/>
           </a:xfrm>
-          <a:prstGeom prst="rect">
-            <a:avLst/>
-          </a:prstGeom>
         </p:spPr>
-      </p:pic>
+        <p:txBody>
+          <a:bodyPr/>
+          <a:lstStyle/>
+          <a:p>
+            <a:r>
+              <a:rPr lang="en-US" dirty="0"/>
+              <a:t>Two ways of seeing n-bit </a:t>
+            </a:r>
+            <a:r>
+              <a:rPr lang="en-US"/>
+              <a:t>2’s complement integers:</a:t>
+            </a:r>
+            <a:endParaRPr lang="en-US" dirty="0"/>
+          </a:p>
+          <a:p>
+            <a:pPr marL="914400" lvl="1" indent="-457200">
+              <a:buFont typeface="+mj-lt"/>
+              <a:buAutoNum type="arabicPeriod"/>
+            </a:pPr>
+            <a:r>
+              <a:rPr lang="en-US" dirty="0"/>
+              <a:t>If the MSB is 1, it’s negative. </a:t>
+            </a:r>
+            <a:br>
+              <a:rPr lang="en-US" dirty="0"/>
+            </a:br>
+            <a:r>
+              <a:rPr lang="en-US" dirty="0"/>
+              <a:t>Flip the rest of the bits and add 1 to get the number</a:t>
+            </a:r>
+          </a:p>
+          <a:p>
+            <a:pPr marL="914400" lvl="1" indent="-457200">
+              <a:buFont typeface="+mj-lt"/>
+              <a:buAutoNum type="arabicPeriod"/>
+            </a:pPr>
+            <a:r>
+              <a:rPr lang="en-US" dirty="0"/>
+              <a:t>The MSB has a value of –(2</a:t>
+            </a:r>
+            <a:r>
+              <a:rPr lang="en-US" baseline="30000" dirty="0"/>
+              <a:t>n-1</a:t>
+            </a:r>
+            <a:r>
+              <a:rPr lang="en-US" dirty="0"/>
+              <a:t>), the rest goes as usual</a:t>
+            </a:r>
+          </a:p>
+          <a:p>
+            <a:pPr marL="0" indent="0">
+              <a:buNone/>
+            </a:pPr>
+            <a:endParaRPr lang="en-US" dirty="0"/>
+          </a:p>
+          <a:p>
+            <a:pPr marL="0" indent="0">
+              <a:buNone/>
+            </a:pPr>
+            <a:r>
+              <a:rPr lang="en-US" dirty="0"/>
+              <a:t>Example: 4-bit 2’s complement</a:t>
+            </a:r>
+          </a:p>
+          <a:p>
+            <a:pPr marL="0" indent="0">
+              <a:buNone/>
+            </a:pPr>
+            <a:r>
+              <a:rPr lang="en-US" dirty="0"/>
+              <a:t>(1101)</a:t>
+            </a:r>
+            <a:r>
+              <a:rPr lang="en-US" baseline="-25000" dirty="0"/>
+              <a:t>2s</a:t>
+            </a:r>
+          </a:p>
+        </p:txBody>
+      </p:sp>
     </p:spTree>
     <p:extLst>
       <p:ext uri="{BB962C8B-B14F-4D97-AF65-F5344CB8AC3E}">
-        <p14:creationId xmlns:p14="http://schemas.microsoft.com/office/powerpoint/2010/main" val="671063241"/>
+        <p14:creationId xmlns:p14="http://schemas.microsoft.com/office/powerpoint/2010/main" val="2704774420"/>
       </p:ext>
     </p:extLst>
   </p:cSld>
@@ -6151,447 +5481,6 @@
           <a:chExt cx="0" cy="0"/>
         </a:xfrm>
       </p:grpSpPr>
-      <p:pic>
-        <p:nvPicPr>
-          <p:cNvPr id="3" name="Picture 2">
-            <a:extLst>
-              <a:ext uri="{FF2B5EF4-FFF2-40B4-BE49-F238E27FC236}">
-                <a16:creationId xmlns:a16="http://schemas.microsoft.com/office/drawing/2014/main" id="{63DB08FC-AAE0-46D3-F896-9C49B65D2C6C}"/>
-              </a:ext>
-            </a:extLst>
-          </p:cNvPr>
-          <p:cNvPicPr>
-            <a:picLocks/>
-          </p:cNvPicPr>
-          <p:nvPr>
-            <p:custDataLst>
-              <p:tags r:id="rId1"/>
-            </p:custDataLst>
-          </p:nvPr>
-        </p:nvPicPr>
-        <p:blipFill>
-          <a:blip r:embed="rId4">
-            <a:extLst>
-              <a:ext uri="{28A0092B-C50C-407E-A947-70E740481C1C}">
-                <a14:useLocalDpi xmlns:a14="http://schemas.microsoft.com/office/drawing/2010/main" val="0"/>
-              </a:ext>
-            </a:extLst>
-          </a:blip>
-          <a:stretch>
-            <a:fillRect/>
-          </a:stretch>
-        </p:blipFill>
-        <p:spPr>
-          <a:xfrm>
-            <a:off x="190500" y="190500"/>
-            <a:ext cx="11811000" cy="6477000"/>
-          </a:xfrm>
-          <a:prstGeom prst="rect">
-            <a:avLst/>
-          </a:prstGeom>
-        </p:spPr>
-      </p:pic>
-    </p:spTree>
-    <p:extLst>
-      <p:ext uri="{BB962C8B-B14F-4D97-AF65-F5344CB8AC3E}">
-        <p14:creationId xmlns:p14="http://schemas.microsoft.com/office/powerpoint/2010/main" val="1988223792"/>
-      </p:ext>
-    </p:extLst>
-  </p:cSld>
-  <p:clrMapOvr>
-    <a:masterClrMapping/>
-  </p:clrMapOvr>
-</p:sld>
-</file>
-
-<file path=ppt/slides/slide16.xml><?xml version="1.0" encoding="utf-8"?>
-<p:sld xmlns:a="http://schemas.openxmlformats.org/drawingml/2006/main" xmlns:r="http://schemas.openxmlformats.org/officeDocument/2006/relationships" xmlns:p="http://schemas.openxmlformats.org/presentationml/2006/main">
-  <p:cSld>
-    <p:spTree>
-      <p:nvGrpSpPr>
-        <p:cNvPr id="1" name=""/>
-        <p:cNvGrpSpPr/>
-        <p:nvPr/>
-      </p:nvGrpSpPr>
-      <p:grpSpPr>
-        <a:xfrm>
-          <a:off x="0" y="0"/>
-          <a:ext cx="0" cy="0"/>
-          <a:chOff x="0" y="0"/>
-          <a:chExt cx="0" cy="0"/>
-        </a:xfrm>
-      </p:grpSpPr>
-      <p:pic>
-        <p:nvPicPr>
-          <p:cNvPr id="3" name="Picture 2">
-            <a:extLst>
-              <a:ext uri="{FF2B5EF4-FFF2-40B4-BE49-F238E27FC236}">
-                <a16:creationId xmlns:a16="http://schemas.microsoft.com/office/drawing/2014/main" id="{537BA4B0-B932-BBEF-D9A5-61C7DE4A0F93}"/>
-              </a:ext>
-            </a:extLst>
-          </p:cNvPr>
-          <p:cNvPicPr>
-            <a:picLocks/>
-          </p:cNvPicPr>
-          <p:nvPr>
-            <p:custDataLst>
-              <p:tags r:id="rId1"/>
-            </p:custDataLst>
-          </p:nvPr>
-        </p:nvPicPr>
-        <p:blipFill>
-          <a:blip r:embed="rId4">
-            <a:extLst>
-              <a:ext uri="{28A0092B-C50C-407E-A947-70E740481C1C}">
-                <a14:useLocalDpi xmlns:a14="http://schemas.microsoft.com/office/drawing/2010/main" val="0"/>
-              </a:ext>
-            </a:extLst>
-          </a:blip>
-          <a:stretch>
-            <a:fillRect/>
-          </a:stretch>
-        </p:blipFill>
-        <p:spPr>
-          <a:xfrm>
-            <a:off x="190500" y="190500"/>
-            <a:ext cx="11811000" cy="6477000"/>
-          </a:xfrm>
-          <a:prstGeom prst="rect">
-            <a:avLst/>
-          </a:prstGeom>
-        </p:spPr>
-      </p:pic>
-    </p:spTree>
-    <p:extLst>
-      <p:ext uri="{BB962C8B-B14F-4D97-AF65-F5344CB8AC3E}">
-        <p14:creationId xmlns:p14="http://schemas.microsoft.com/office/powerpoint/2010/main" val="2195313342"/>
-      </p:ext>
-    </p:extLst>
-  </p:cSld>
-  <p:clrMapOvr>
-    <a:masterClrMapping/>
-  </p:clrMapOvr>
-</p:sld>
-</file>
-
-<file path=ppt/slides/slide17.xml><?xml version="1.0" encoding="utf-8"?>
-<p:sld xmlns:a="http://schemas.openxmlformats.org/drawingml/2006/main" xmlns:r="http://schemas.openxmlformats.org/officeDocument/2006/relationships" xmlns:p="http://schemas.openxmlformats.org/presentationml/2006/main">
-  <p:cSld>
-    <p:spTree>
-      <p:nvGrpSpPr>
-        <p:cNvPr id="1" name=""/>
-        <p:cNvGrpSpPr/>
-        <p:nvPr/>
-      </p:nvGrpSpPr>
-      <p:grpSpPr>
-        <a:xfrm>
-          <a:off x="0" y="0"/>
-          <a:ext cx="0" cy="0"/>
-          <a:chOff x="0" y="0"/>
-          <a:chExt cx="0" cy="0"/>
-        </a:xfrm>
-      </p:grpSpPr>
-      <p:sp>
-        <p:nvSpPr>
-          <p:cNvPr id="2" name="Title 1">
-            <a:extLst>
-              <a:ext uri="{FF2B5EF4-FFF2-40B4-BE49-F238E27FC236}">
-                <a16:creationId xmlns:a16="http://schemas.microsoft.com/office/drawing/2014/main" id="{4BB0EE00-9385-92E3-0B23-214EA83A115F}"/>
-              </a:ext>
-            </a:extLst>
-          </p:cNvPr>
-          <p:cNvSpPr>
-            <a:spLocks noGrp="1"/>
-          </p:cNvSpPr>
-          <p:nvPr>
-            <p:ph type="title"/>
-          </p:nvPr>
-        </p:nvSpPr>
-        <p:spPr/>
-        <p:txBody>
-          <a:bodyPr/>
-          <a:lstStyle/>
-          <a:p>
-            <a:r>
-              <a:rPr lang="en-US" dirty="0"/>
-              <a:t>Unsigned, 1s complement, 2s complement</a:t>
-            </a:r>
-          </a:p>
-        </p:txBody>
-      </p:sp>
-      <p:sp>
-        <p:nvSpPr>
-          <p:cNvPr id="3" name="Content Placeholder 2">
-            <a:extLst>
-              <a:ext uri="{FF2B5EF4-FFF2-40B4-BE49-F238E27FC236}">
-                <a16:creationId xmlns:a16="http://schemas.microsoft.com/office/drawing/2014/main" id="{AA04C9A6-09D5-1232-D89A-815F78419C61}"/>
-              </a:ext>
-            </a:extLst>
-          </p:cNvPr>
-          <p:cNvSpPr>
-            <a:spLocks noGrp="1"/>
-          </p:cNvSpPr>
-          <p:nvPr>
-            <p:ph idx="1"/>
-          </p:nvPr>
-        </p:nvSpPr>
-        <p:spPr>
-          <a:xfrm>
-            <a:off x="838200" y="1825625"/>
-            <a:ext cx="10515600" cy="4351338"/>
-          </a:xfrm>
-        </p:spPr>
-        <p:txBody>
-          <a:bodyPr/>
-          <a:lstStyle/>
-          <a:p>
-            <a:r>
-              <a:rPr lang="en-US" dirty="0"/>
-              <a:t>Two ways of seeing n-bit 1’s complement:</a:t>
-            </a:r>
-          </a:p>
-          <a:p>
-            <a:pPr marL="914400" lvl="1" indent="-457200">
-              <a:buFont typeface="+mj-lt"/>
-              <a:buAutoNum type="arabicPeriod"/>
-            </a:pPr>
-            <a:r>
-              <a:rPr lang="en-US" dirty="0"/>
-              <a:t>If the MSB is 1, it’s negative. Flip the rest of the bits to get the number</a:t>
-            </a:r>
-          </a:p>
-          <a:p>
-            <a:pPr marL="914400" lvl="1" indent="-457200">
-              <a:buFont typeface="+mj-lt"/>
-              <a:buAutoNum type="arabicPeriod"/>
-            </a:pPr>
-            <a:r>
-              <a:rPr lang="en-US" dirty="0"/>
-              <a:t>The MSB has a value of –(2</a:t>
-            </a:r>
-            <a:r>
-              <a:rPr lang="en-US" baseline="30000" dirty="0"/>
-              <a:t>n-1</a:t>
-            </a:r>
-            <a:r>
-              <a:rPr lang="en-US" dirty="0"/>
-              <a:t> – 1), the rest goes as usual</a:t>
-            </a:r>
-          </a:p>
-          <a:p>
-            <a:pPr marL="0" indent="0">
-              <a:buNone/>
-            </a:pPr>
-            <a:endParaRPr lang="en-US" dirty="0"/>
-          </a:p>
-          <a:p>
-            <a:pPr marL="0" indent="0">
-              <a:buNone/>
-            </a:pPr>
-            <a:r>
-              <a:rPr lang="en-US" dirty="0"/>
-              <a:t>Example: 4-bit 1’s complement</a:t>
-            </a:r>
-          </a:p>
-          <a:p>
-            <a:pPr marL="0" indent="0">
-              <a:buNone/>
-            </a:pPr>
-            <a:r>
-              <a:rPr lang="en-US" dirty="0"/>
-              <a:t>(1101)</a:t>
-            </a:r>
-            <a:r>
-              <a:rPr lang="en-US" baseline="-25000" dirty="0"/>
-              <a:t>1s</a:t>
-            </a:r>
-          </a:p>
-        </p:txBody>
-      </p:sp>
-    </p:spTree>
-    <p:extLst>
-      <p:ext uri="{BB962C8B-B14F-4D97-AF65-F5344CB8AC3E}">
-        <p14:creationId xmlns:p14="http://schemas.microsoft.com/office/powerpoint/2010/main" val="2487549993"/>
-      </p:ext>
-    </p:extLst>
-  </p:cSld>
-  <p:clrMapOvr>
-    <a:masterClrMapping/>
-  </p:clrMapOvr>
-</p:sld>
-</file>
-
-<file path=ppt/slides/slide18.xml><?xml version="1.0" encoding="utf-8"?>
-<p:sld xmlns:a="http://schemas.openxmlformats.org/drawingml/2006/main" xmlns:r="http://schemas.openxmlformats.org/officeDocument/2006/relationships" xmlns:p="http://schemas.openxmlformats.org/presentationml/2006/main">
-  <p:cSld>
-    <p:spTree>
-      <p:nvGrpSpPr>
-        <p:cNvPr id="1" name=""/>
-        <p:cNvGrpSpPr/>
-        <p:nvPr/>
-      </p:nvGrpSpPr>
-      <p:grpSpPr>
-        <a:xfrm>
-          <a:off x="0" y="0"/>
-          <a:ext cx="0" cy="0"/>
-          <a:chOff x="0" y="0"/>
-          <a:chExt cx="0" cy="0"/>
-        </a:xfrm>
-      </p:grpSpPr>
-      <p:sp>
-        <p:nvSpPr>
-          <p:cNvPr id="2" name="Title 1">
-            <a:extLst>
-              <a:ext uri="{FF2B5EF4-FFF2-40B4-BE49-F238E27FC236}">
-                <a16:creationId xmlns:a16="http://schemas.microsoft.com/office/drawing/2014/main" id="{4BB0EE00-9385-92E3-0B23-214EA83A115F}"/>
-              </a:ext>
-            </a:extLst>
-          </p:cNvPr>
-          <p:cNvSpPr>
-            <a:spLocks noGrp="1"/>
-          </p:cNvSpPr>
-          <p:nvPr>
-            <p:ph type="title"/>
-          </p:nvPr>
-        </p:nvSpPr>
-        <p:spPr/>
-        <p:txBody>
-          <a:bodyPr/>
-          <a:lstStyle/>
-          <a:p>
-            <a:r>
-              <a:rPr lang="en-US" dirty="0"/>
-              <a:t>Unsigned, 1s complement, 2s complement</a:t>
-            </a:r>
-          </a:p>
-        </p:txBody>
-      </p:sp>
-      <p:sp>
-        <p:nvSpPr>
-          <p:cNvPr id="3" name="Content Placeholder 2">
-            <a:extLst>
-              <a:ext uri="{FF2B5EF4-FFF2-40B4-BE49-F238E27FC236}">
-                <a16:creationId xmlns:a16="http://schemas.microsoft.com/office/drawing/2014/main" id="{AA04C9A6-09D5-1232-D89A-815F78419C61}"/>
-              </a:ext>
-            </a:extLst>
-          </p:cNvPr>
-          <p:cNvSpPr>
-            <a:spLocks noGrp="1"/>
-          </p:cNvSpPr>
-          <p:nvPr>
-            <p:ph idx="1"/>
-          </p:nvPr>
-        </p:nvSpPr>
-        <p:spPr>
-          <a:xfrm>
-            <a:off x="838200" y="1825625"/>
-            <a:ext cx="10515600" cy="4351338"/>
-          </a:xfrm>
-        </p:spPr>
-        <p:txBody>
-          <a:bodyPr/>
-          <a:lstStyle/>
-          <a:p>
-            <a:r>
-              <a:rPr lang="en-US" dirty="0"/>
-              <a:t>Two ways of seeing n-bit 2’s complement:</a:t>
-            </a:r>
-          </a:p>
-          <a:p>
-            <a:pPr marL="914400" lvl="1" indent="-457200">
-              <a:buFont typeface="+mj-lt"/>
-              <a:buAutoNum type="arabicPeriod"/>
-            </a:pPr>
-            <a:r>
-              <a:rPr lang="en-US" dirty="0"/>
-              <a:t>If the MSB is 1, it’s negative. </a:t>
-            </a:r>
-            <a:br>
-              <a:rPr lang="en-US" dirty="0"/>
-            </a:br>
-            <a:r>
-              <a:rPr lang="en-US" dirty="0"/>
-              <a:t>Flip the rest of the bits and add 1 to get the number</a:t>
-            </a:r>
-          </a:p>
-          <a:p>
-            <a:pPr marL="914400" lvl="1" indent="-457200">
-              <a:buFont typeface="+mj-lt"/>
-              <a:buAutoNum type="arabicPeriod"/>
-            </a:pPr>
-            <a:r>
-              <a:rPr lang="en-US" dirty="0"/>
-              <a:t>The MSB has a value of –(2</a:t>
-            </a:r>
-            <a:r>
-              <a:rPr lang="en-US" baseline="30000" dirty="0"/>
-              <a:t>n-1</a:t>
-            </a:r>
-            <a:r>
-              <a:rPr lang="en-US" dirty="0"/>
-              <a:t>), the rest goes as usual</a:t>
-            </a:r>
-          </a:p>
-          <a:p>
-            <a:pPr marL="0" indent="0">
-              <a:buNone/>
-            </a:pPr>
-            <a:endParaRPr lang="en-US" dirty="0"/>
-          </a:p>
-          <a:p>
-            <a:pPr marL="0" indent="0">
-              <a:buNone/>
-            </a:pPr>
-            <a:r>
-              <a:rPr lang="en-US" dirty="0"/>
-              <a:t>Example: 4-bit 2’s complement</a:t>
-            </a:r>
-          </a:p>
-          <a:p>
-            <a:pPr marL="0" indent="0">
-              <a:buNone/>
-            </a:pPr>
-            <a:r>
-              <a:rPr lang="en-US" dirty="0"/>
-              <a:t>(1101)</a:t>
-            </a:r>
-            <a:r>
-              <a:rPr lang="en-US" baseline="-25000" dirty="0"/>
-              <a:t>2s</a:t>
-            </a:r>
-          </a:p>
-        </p:txBody>
-      </p:sp>
-    </p:spTree>
-    <p:extLst>
-      <p:ext uri="{BB962C8B-B14F-4D97-AF65-F5344CB8AC3E}">
-        <p14:creationId xmlns:p14="http://schemas.microsoft.com/office/powerpoint/2010/main" val="2704774420"/>
-      </p:ext>
-    </p:extLst>
-  </p:cSld>
-  <p:clrMapOvr>
-    <a:masterClrMapping/>
-  </p:clrMapOvr>
-</p:sld>
-</file>
-
-<file path=ppt/slides/slide19.xml><?xml version="1.0" encoding="utf-8"?>
-<p:sld xmlns:a="http://schemas.openxmlformats.org/drawingml/2006/main" xmlns:r="http://schemas.openxmlformats.org/officeDocument/2006/relationships" xmlns:p="http://schemas.openxmlformats.org/presentationml/2006/main">
-  <p:cSld>
-    <p:spTree>
-      <p:nvGrpSpPr>
-        <p:cNvPr id="1" name=""/>
-        <p:cNvGrpSpPr/>
-        <p:nvPr/>
-      </p:nvGrpSpPr>
-      <p:grpSpPr>
-        <a:xfrm>
-          <a:off x="0" y="0"/>
-          <a:ext cx="0" cy="0"/>
-          <a:chOff x="0" y="0"/>
-          <a:chExt cx="0" cy="0"/>
-        </a:xfrm>
-      </p:grpSpPr>
       <p:sp>
         <p:nvSpPr>
           <p:cNvPr id="2" name="Title 1">
@@ -6852,402 +5741,7 @@
 </p:sld>
 </file>
 
-<file path=ppt/slides/slide2.xml><?xml version="1.0" encoding="utf-8"?>
-<p:sld xmlns:a="http://schemas.openxmlformats.org/drawingml/2006/main" xmlns:r="http://schemas.openxmlformats.org/officeDocument/2006/relationships" xmlns:p="http://schemas.openxmlformats.org/presentationml/2006/main">
-  <p:cSld>
-    <p:spTree>
-      <p:nvGrpSpPr>
-        <p:cNvPr id="1" name=""/>
-        <p:cNvGrpSpPr/>
-        <p:nvPr/>
-      </p:nvGrpSpPr>
-      <p:grpSpPr>
-        <a:xfrm>
-          <a:off x="0" y="0"/>
-          <a:ext cx="0" cy="0"/>
-          <a:chOff x="0" y="0"/>
-          <a:chExt cx="0" cy="0"/>
-        </a:xfrm>
-      </p:grpSpPr>
-      <p:sp>
-        <p:nvSpPr>
-          <p:cNvPr id="2" name="Title 1">
-            <a:extLst>
-              <a:ext uri="{FF2B5EF4-FFF2-40B4-BE49-F238E27FC236}">
-                <a16:creationId xmlns:a16="http://schemas.microsoft.com/office/drawing/2014/main" id="{F846E162-1F71-4B5A-F685-F41006BA6AC2}"/>
-              </a:ext>
-            </a:extLst>
-          </p:cNvPr>
-          <p:cNvSpPr>
-            <a:spLocks noGrp="1"/>
-          </p:cNvSpPr>
-          <p:nvPr>
-            <p:ph type="title"/>
-          </p:nvPr>
-        </p:nvSpPr>
-        <p:spPr/>
-        <p:txBody>
-          <a:bodyPr/>
-          <a:lstStyle/>
-          <a:p>
-            <a:r>
-              <a:rPr lang="en-US" dirty="0"/>
-              <a:t>About myself</a:t>
-            </a:r>
-          </a:p>
-        </p:txBody>
-      </p:sp>
-      <p:sp>
-        <p:nvSpPr>
-          <p:cNvPr id="3" name="Content Placeholder 2">
-            <a:extLst>
-              <a:ext uri="{FF2B5EF4-FFF2-40B4-BE49-F238E27FC236}">
-                <a16:creationId xmlns:a16="http://schemas.microsoft.com/office/drawing/2014/main" id="{23BBDEF9-7024-1337-E6A5-0A13F8EEDDE0}"/>
-              </a:ext>
-            </a:extLst>
-          </p:cNvPr>
-          <p:cNvSpPr>
-            <a:spLocks noGrp="1"/>
-          </p:cNvSpPr>
-          <p:nvPr>
-            <p:ph idx="1"/>
-          </p:nvPr>
-        </p:nvSpPr>
-        <p:spPr>
-          <a:xfrm>
-            <a:off x="838200" y="1825625"/>
-            <a:ext cx="10515600" cy="4667250"/>
-          </a:xfrm>
-        </p:spPr>
-        <p:txBody>
-          <a:bodyPr/>
-          <a:lstStyle/>
-          <a:p>
-            <a:pPr marL="0" indent="0">
-              <a:buNone/>
-            </a:pPr>
-            <a:r>
-              <a:rPr lang="en-US" sz="3200" dirty="0"/>
-              <a:t>Theodore Leebrant</a:t>
-            </a:r>
-          </a:p>
-          <a:p>
-            <a:pPr marL="0" indent="0">
-              <a:buNone/>
-            </a:pPr>
-            <a:r>
-              <a:rPr lang="en-US" sz="2000" dirty="0"/>
-              <a:t>(Theodore/Theo is good!)</a:t>
-            </a:r>
-          </a:p>
-          <a:p>
-            <a:pPr marL="0" indent="0">
-              <a:buNone/>
-            </a:pPr>
-            <a:endParaRPr lang="en-US" sz="600" dirty="0"/>
-          </a:p>
-          <a:p>
-            <a:r>
-              <a:rPr lang="en-US" dirty="0"/>
-              <a:t>Computer Science + Mathematics</a:t>
-            </a:r>
-          </a:p>
-          <a:p>
-            <a:pPr lvl="1"/>
-            <a:r>
-              <a:rPr lang="en-US" dirty="0"/>
-              <a:t>was a Programming Languages nerd, mostly with Rust</a:t>
-            </a:r>
-          </a:p>
-          <a:p>
-            <a:pPr lvl="1"/>
-            <a:r>
-              <a:rPr lang="en-US" dirty="0"/>
-              <a:t>teaching CS3210 (Parallel Programming) as well this semester</a:t>
-            </a:r>
-          </a:p>
-          <a:p>
-            <a:r>
-              <a:rPr lang="en-US" dirty="0"/>
-              <a:t>Plays too much Final Fantasy XIV</a:t>
-            </a:r>
-          </a:p>
-          <a:p>
-            <a:r>
-              <a:rPr lang="en-US" dirty="0"/>
-              <a:t>Out-of-tutorial communication:</a:t>
-            </a:r>
-          </a:p>
-          <a:p>
-            <a:pPr lvl="1"/>
-            <a:r>
-              <a:rPr lang="en-US" dirty="0"/>
-              <a:t>Email: </a:t>
-            </a:r>
-            <a:r>
-              <a:rPr lang="en-US" dirty="0">
-                <a:hlinkClick r:id="rId3"/>
-              </a:rPr>
-              <a:t>theo@comp.nus.edu.sg</a:t>
-            </a:r>
-            <a:r>
-              <a:rPr lang="en-US" dirty="0"/>
-              <a:t> for consults, questions</a:t>
-            </a:r>
-          </a:p>
-          <a:p>
-            <a:pPr lvl="1"/>
-            <a:r>
-              <a:rPr lang="en-US" dirty="0"/>
-              <a:t>Telegram: next slide</a:t>
-            </a:r>
-          </a:p>
-          <a:p>
-            <a:pPr lvl="1"/>
-            <a:r>
-              <a:rPr lang="en-US" dirty="0"/>
-              <a:t>Will reply messages within 24 hours – </a:t>
-            </a:r>
-            <a:r>
-              <a:rPr lang="en-US" dirty="0">
-                <a:latin typeface="AndesNeue Alt 2 Book it" panose="00000500000000000000" pitchFamily="2" charset="0"/>
-              </a:rPr>
-              <a:t>except 2 days before deadlines</a:t>
-            </a:r>
-          </a:p>
-          <a:p>
-            <a:pPr lvl="1"/>
-            <a:endParaRPr lang="en-US" dirty="0"/>
-          </a:p>
-          <a:p>
-            <a:endParaRPr lang="en-US" dirty="0"/>
-          </a:p>
-        </p:txBody>
-      </p:sp>
-    </p:spTree>
-    <p:extLst>
-      <p:ext uri="{BB962C8B-B14F-4D97-AF65-F5344CB8AC3E}">
-        <p14:creationId xmlns:p14="http://schemas.microsoft.com/office/powerpoint/2010/main" val="2586703534"/>
-      </p:ext>
-    </p:extLst>
-  </p:cSld>
-  <p:clrMapOvr>
-    <a:masterClrMapping/>
-  </p:clrMapOvr>
-</p:sld>
-</file>
-
-<file path=ppt/slides/slide20.xml><?xml version="1.0" encoding="utf-8"?>
-<p:sld xmlns:a="http://schemas.openxmlformats.org/drawingml/2006/main" xmlns:r="http://schemas.openxmlformats.org/officeDocument/2006/relationships" xmlns:p="http://schemas.openxmlformats.org/presentationml/2006/main">
-  <p:cSld>
-    <p:spTree>
-      <p:nvGrpSpPr>
-        <p:cNvPr id="1" name=""/>
-        <p:cNvGrpSpPr/>
-        <p:nvPr/>
-      </p:nvGrpSpPr>
-      <p:grpSpPr>
-        <a:xfrm>
-          <a:off x="0" y="0"/>
-          <a:ext cx="0" cy="0"/>
-          <a:chOff x="0" y="0"/>
-          <a:chExt cx="0" cy="0"/>
-        </a:xfrm>
-      </p:grpSpPr>
-      <p:pic>
-        <p:nvPicPr>
-          <p:cNvPr id="3" name="Picture 2">
-            <a:extLst>
-              <a:ext uri="{FF2B5EF4-FFF2-40B4-BE49-F238E27FC236}">
-                <a16:creationId xmlns:a16="http://schemas.microsoft.com/office/drawing/2014/main" id="{4EF3D2E2-C128-C4F2-EF46-330B3A4154A0}"/>
-              </a:ext>
-            </a:extLst>
-          </p:cNvPr>
-          <p:cNvPicPr>
-            <a:picLocks/>
-          </p:cNvPicPr>
-          <p:nvPr>
-            <p:custDataLst>
-              <p:tags r:id="rId1"/>
-            </p:custDataLst>
-          </p:nvPr>
-        </p:nvPicPr>
-        <p:blipFill>
-          <a:blip r:embed="rId4">
-            <a:extLst>
-              <a:ext uri="{28A0092B-C50C-407E-A947-70E740481C1C}">
-                <a14:useLocalDpi xmlns:a14="http://schemas.microsoft.com/office/drawing/2010/main" val="0"/>
-              </a:ext>
-            </a:extLst>
-          </a:blip>
-          <a:stretch>
-            <a:fillRect/>
-          </a:stretch>
-        </p:blipFill>
-        <p:spPr>
-          <a:xfrm>
-            <a:off x="190500" y="190500"/>
-            <a:ext cx="11811000" cy="6477000"/>
-          </a:xfrm>
-          <a:prstGeom prst="rect">
-            <a:avLst/>
-          </a:prstGeom>
-        </p:spPr>
-      </p:pic>
-    </p:spTree>
-    <p:extLst>
-      <p:ext uri="{BB962C8B-B14F-4D97-AF65-F5344CB8AC3E}">
-        <p14:creationId xmlns:p14="http://schemas.microsoft.com/office/powerpoint/2010/main" val="622275479"/>
-      </p:ext>
-    </p:extLst>
-  </p:cSld>
-  <p:clrMapOvr>
-    <a:masterClrMapping/>
-  </p:clrMapOvr>
-</p:sld>
-</file>
-
-<file path=ppt/slides/slide21.xml><?xml version="1.0" encoding="utf-8"?>
-<p:sld xmlns:a="http://schemas.openxmlformats.org/drawingml/2006/main" xmlns:r="http://schemas.openxmlformats.org/officeDocument/2006/relationships" xmlns:p="http://schemas.openxmlformats.org/presentationml/2006/main">
-  <p:cSld>
-    <p:spTree>
-      <p:nvGrpSpPr>
-        <p:cNvPr id="1" name=""/>
-        <p:cNvGrpSpPr/>
-        <p:nvPr/>
-      </p:nvGrpSpPr>
-      <p:grpSpPr>
-        <a:xfrm>
-          <a:off x="0" y="0"/>
-          <a:ext cx="0" cy="0"/>
-          <a:chOff x="0" y="0"/>
-          <a:chExt cx="0" cy="0"/>
-        </a:xfrm>
-      </p:grpSpPr>
-      <p:pic>
-        <p:nvPicPr>
-          <p:cNvPr id="3" name="Picture 2">
-            <a:extLst>
-              <a:ext uri="{FF2B5EF4-FFF2-40B4-BE49-F238E27FC236}">
-                <a16:creationId xmlns:a16="http://schemas.microsoft.com/office/drawing/2014/main" id="{9FB89C2D-7DBF-66AA-9768-18F41917F7CA}"/>
-              </a:ext>
-            </a:extLst>
-          </p:cNvPr>
-          <p:cNvPicPr>
-            <a:picLocks/>
-          </p:cNvPicPr>
-          <p:nvPr>
-            <p:custDataLst>
-              <p:tags r:id="rId1"/>
-            </p:custDataLst>
-          </p:nvPr>
-        </p:nvPicPr>
-        <p:blipFill>
-          <a:blip r:embed="rId4">
-            <a:extLst>
-              <a:ext uri="{28A0092B-C50C-407E-A947-70E740481C1C}">
-                <a14:useLocalDpi xmlns:a14="http://schemas.microsoft.com/office/drawing/2010/main" val="0"/>
-              </a:ext>
-            </a:extLst>
-          </a:blip>
-          <a:stretch>
-            <a:fillRect/>
-          </a:stretch>
-        </p:blipFill>
-        <p:spPr>
-          <a:xfrm>
-            <a:off x="190500" y="190500"/>
-            <a:ext cx="11811000" cy="6477000"/>
-          </a:xfrm>
-          <a:prstGeom prst="rect">
-            <a:avLst/>
-          </a:prstGeom>
-        </p:spPr>
-      </p:pic>
-    </p:spTree>
-    <p:extLst>
-      <p:ext uri="{BB962C8B-B14F-4D97-AF65-F5344CB8AC3E}">
-        <p14:creationId xmlns:p14="http://schemas.microsoft.com/office/powerpoint/2010/main" val="2032896151"/>
-      </p:ext>
-    </p:extLst>
-  </p:cSld>
-  <p:clrMapOvr>
-    <a:masterClrMapping/>
-  </p:clrMapOvr>
-</p:sld>
-</file>
-
-<file path=ppt/slides/slide22.xml><?xml version="1.0" encoding="utf-8"?>
-<p:sld xmlns:a="http://schemas.openxmlformats.org/drawingml/2006/main" xmlns:r="http://schemas.openxmlformats.org/officeDocument/2006/relationships" xmlns:p="http://schemas.openxmlformats.org/presentationml/2006/main">
-  <p:cSld>
-    <p:spTree>
-      <p:nvGrpSpPr>
-        <p:cNvPr id="1" name=""/>
-        <p:cNvGrpSpPr/>
-        <p:nvPr/>
-      </p:nvGrpSpPr>
-      <p:grpSpPr>
-        <a:xfrm>
-          <a:off x="0" y="0"/>
-          <a:ext cx="0" cy="0"/>
-          <a:chOff x="0" y="0"/>
-          <a:chExt cx="0" cy="0"/>
-        </a:xfrm>
-      </p:grpSpPr>
-      <p:pic>
-        <p:nvPicPr>
-          <p:cNvPr id="3" name="Picture 2">
-            <a:extLst>
-              <a:ext uri="{FF2B5EF4-FFF2-40B4-BE49-F238E27FC236}">
-                <a16:creationId xmlns:a16="http://schemas.microsoft.com/office/drawing/2014/main" id="{6F2C244F-4510-5325-B5A6-4E0D5CFE15C1}"/>
-              </a:ext>
-            </a:extLst>
-          </p:cNvPr>
-          <p:cNvPicPr>
-            <a:picLocks/>
-          </p:cNvPicPr>
-          <p:nvPr>
-            <p:custDataLst>
-              <p:tags r:id="rId1"/>
-            </p:custDataLst>
-          </p:nvPr>
-        </p:nvPicPr>
-        <p:blipFill>
-          <a:blip r:embed="rId4">
-            <a:extLst>
-              <a:ext uri="{28A0092B-C50C-407E-A947-70E740481C1C}">
-                <a14:useLocalDpi xmlns:a14="http://schemas.microsoft.com/office/drawing/2010/main" val="0"/>
-              </a:ext>
-            </a:extLst>
-          </a:blip>
-          <a:stretch>
-            <a:fillRect/>
-          </a:stretch>
-        </p:blipFill>
-        <p:spPr>
-          <a:xfrm>
-            <a:off x="190500" y="190500"/>
-            <a:ext cx="11811000" cy="6477000"/>
-          </a:xfrm>
-          <a:prstGeom prst="rect">
-            <a:avLst/>
-          </a:prstGeom>
-        </p:spPr>
-      </p:pic>
-    </p:spTree>
-    <p:extLst>
-      <p:ext uri="{BB962C8B-B14F-4D97-AF65-F5344CB8AC3E}">
-        <p14:creationId xmlns:p14="http://schemas.microsoft.com/office/powerpoint/2010/main" val="3500233209"/>
-      </p:ext>
-    </p:extLst>
-  </p:cSld>
-  <p:clrMapOvr>
-    <a:masterClrMapping/>
-  </p:clrMapOvr>
-</p:sld>
-</file>
-
-<file path=ppt/slides/slide23.xml><?xml version="1.0" encoding="utf-8"?>
+<file path=ppt/slides/slide16.xml><?xml version="1.0" encoding="utf-8"?>
 <p:sld xmlns:a="http://schemas.openxmlformats.org/drawingml/2006/main" xmlns:r="http://schemas.openxmlformats.org/officeDocument/2006/relationships" xmlns:p="http://schemas.openxmlformats.org/presentationml/2006/main">
   <p:cSld>
     <p:spTree>
@@ -8048,7 +6542,7 @@
 </p:sld>
 </file>
 
-<file path=ppt/slides/slide24.xml><?xml version="1.0" encoding="utf-8"?>
+<file path=ppt/slides/slide17.xml><?xml version="1.0" encoding="utf-8"?>
 <p:sld xmlns:a="http://schemas.openxmlformats.org/drawingml/2006/main" xmlns:r="http://schemas.openxmlformats.org/officeDocument/2006/relationships" xmlns:p="http://schemas.openxmlformats.org/presentationml/2006/main">
   <p:cSld>
     <p:spTree>
@@ -9925,7 +8419,7 @@
 </p:sld>
 </file>
 
-<file path=ppt/slides/slide25.xml><?xml version="1.0" encoding="utf-8"?>
+<file path=ppt/slides/slide18.xml><?xml version="1.0" encoding="utf-8"?>
 <p:sld xmlns:a="http://schemas.openxmlformats.org/drawingml/2006/main" xmlns:r="http://schemas.openxmlformats.org/officeDocument/2006/relationships" xmlns:p="http://schemas.openxmlformats.org/presentationml/2006/main">
   <p:cSld>
     <p:spTree>
@@ -10232,7 +8726,7 @@
 </p:sld>
 </file>
 
-<file path=ppt/slides/slide26.xml><?xml version="1.0" encoding="utf-8"?>
+<file path=ppt/slides/slide19.xml><?xml version="1.0" encoding="utf-8"?>
 <p:sld xmlns:a="http://schemas.openxmlformats.org/drawingml/2006/main" xmlns:r="http://schemas.openxmlformats.org/officeDocument/2006/relationships" xmlns:p="http://schemas.openxmlformats.org/presentationml/2006/main">
   <p:cSld>
     <p:spTree>
@@ -10635,7 +9129,7 @@
 </p:sld>
 </file>
 
-<file path=ppt/slides/slide27.xml><?xml version="1.0" encoding="utf-8"?>
+<file path=ppt/slides/slide2.xml><?xml version="1.0" encoding="utf-8"?>
 <p:sld xmlns:a="http://schemas.openxmlformats.org/drawingml/2006/main" xmlns:r="http://schemas.openxmlformats.org/officeDocument/2006/relationships" xmlns:p="http://schemas.openxmlformats.org/presentationml/2006/main">
   <p:cSld>
     <p:spTree>
@@ -10657,7 +9151,7 @@
           <p:cNvPr id="2" name="Title 1">
             <a:extLst>
               <a:ext uri="{FF2B5EF4-FFF2-40B4-BE49-F238E27FC236}">
-                <a16:creationId xmlns:a16="http://schemas.microsoft.com/office/drawing/2014/main" id="{830F9886-B683-03A2-6169-B73C5DDBB242}"/>
+                <a16:creationId xmlns:a16="http://schemas.microsoft.com/office/drawing/2014/main" id="{F846E162-1F71-4B5A-F685-F41006BA6AC2}"/>
               </a:ext>
             </a:extLst>
           </p:cNvPr>
@@ -10675,15 +9169,8 @@
           <a:p>
             <a:r>
               <a:rPr lang="en-US" dirty="0"/>
-              <a:t>Q3. Decimal </a:t>
-            </a:r>
-            <a:r>
-              <a:rPr lang="en-US" dirty="0">
-                <a:sym typeface="Wingdings" panose="05000000000000000000" pitchFamily="2" charset="2"/>
-              </a:rPr>
-              <a:t> Fixed point binary</a:t>
-            </a:r>
-            <a:endParaRPr lang="en-US" dirty="0"/>
+              <a:t>About myself</a:t>
+            </a:r>
           </a:p>
         </p:txBody>
       </p:sp>
@@ -10692,7 +9179,7 @@
           <p:cNvPr id="3" name="Content Placeholder 2">
             <a:extLst>
               <a:ext uri="{FF2B5EF4-FFF2-40B4-BE49-F238E27FC236}">
-                <a16:creationId xmlns:a16="http://schemas.microsoft.com/office/drawing/2014/main" id="{FFCAE40F-544E-15CF-241A-4F3D4671E829}"/>
+                <a16:creationId xmlns:a16="http://schemas.microsoft.com/office/drawing/2014/main" id="{23BBDEF9-7024-1337-E6A5-0A13F8EEDDE0}"/>
               </a:ext>
             </a:extLst>
           </p:cNvPr>
@@ -10703,258 +9190,129 @@
             <p:ph idx="1"/>
           </p:nvPr>
         </p:nvSpPr>
-        <p:spPr/>
-        <p:txBody>
-          <a:bodyPr>
-            <a:normAutofit/>
-          </a:bodyPr>
+        <p:spPr>
+          <a:xfrm>
+            <a:off x="838200" y="1825625"/>
+            <a:ext cx="10515600" cy="4667250"/>
+          </a:xfrm>
+        </p:spPr>
+        <p:txBody>
+          <a:bodyPr/>
           <a:lstStyle/>
           <a:p>
             <a:pPr marL="0" indent="0">
               <a:buNone/>
             </a:pPr>
             <a:r>
-              <a:rPr lang="en-US" u="sng" dirty="0"/>
-              <a:t>Question</a:t>
-            </a:r>
-            <a:br>
-              <a:rPr lang="en-US" u="sng" dirty="0"/>
-            </a:br>
-            <a:r>
-              <a:rPr lang="en-US" dirty="0"/>
-              <a:t>Convert it back to decimal.</a:t>
-            </a:r>
-            <a:endParaRPr lang="en-US" u="sng" dirty="0"/>
-          </a:p>
-          <a:p>
-            <a:pPr marL="514350" indent="-514350">
-              <a:lnSpc>
-                <a:spcPct val="150000"/>
-              </a:lnSpc>
-              <a:buFont typeface="Arial" panose="020B0604020202020204" pitchFamily="34" charset="0"/>
-              <a:buAutoNum type="alphaLcParenBoth"/>
+              <a:rPr lang="en-US" sz="3200" dirty="0"/>
+              <a:t>Theodore Leebrant</a:t>
+            </a:r>
+          </a:p>
+          <a:p>
+            <a:pPr marL="0" indent="0">
+              <a:buNone/>
             </a:pPr>
             <a:r>
-              <a:rPr lang="en-SG" sz="2800" dirty="0"/>
-              <a:t>(0001.110)</a:t>
-            </a:r>
-            <a:r>
-              <a:rPr lang="en-SG" sz="2800" baseline="-25000" dirty="0"/>
-              <a:t>2s</a:t>
-            </a:r>
-            <a:r>
-              <a:rPr lang="en-SG" sz="2800" dirty="0"/>
-              <a:t> 	= (0001.110)</a:t>
-            </a:r>
-            <a:r>
-              <a:rPr lang="en-SG" sz="2800" baseline="-25000" dirty="0"/>
-              <a:t>2</a:t>
-            </a:r>
-            <a:r>
-              <a:rPr lang="en-SG" sz="2800" dirty="0"/>
-              <a:t> 	= 2</a:t>
-            </a:r>
-            <a:r>
-              <a:rPr lang="en-SG" sz="2800" baseline="30000" dirty="0"/>
-              <a:t>0</a:t>
-            </a:r>
-            <a:r>
-              <a:rPr lang="en-SG" sz="2800" dirty="0"/>
-              <a:t> + 2</a:t>
-            </a:r>
-            <a:r>
-              <a:rPr lang="en-SG" sz="2800" baseline="30000" dirty="0"/>
-              <a:t>-1</a:t>
-            </a:r>
-            <a:r>
-              <a:rPr lang="en-SG" sz="2800" dirty="0"/>
-              <a:t> + 2</a:t>
-            </a:r>
-            <a:r>
-              <a:rPr lang="en-SG" sz="2800" baseline="30000" dirty="0"/>
-              <a:t>-2</a:t>
-            </a:r>
-            <a:r>
-              <a:rPr lang="en-SG" sz="2800" dirty="0"/>
-              <a:t> 		= 1.75</a:t>
-            </a:r>
+              <a:rPr lang="en-US" sz="2000" dirty="0"/>
+              <a:t>(Theodore/Theo is good!)</a:t>
+            </a:r>
+          </a:p>
+          <a:p>
+            <a:pPr marL="0" indent="0">
+              <a:buNone/>
+            </a:pPr>
+            <a:endParaRPr lang="en-US" sz="600" dirty="0"/>
+          </a:p>
+          <a:p>
+            <a:r>
+              <a:rPr lang="en-US" dirty="0"/>
+              <a:t>Computer Science + Mathematics</a:t>
+            </a:r>
+          </a:p>
+          <a:p>
+            <a:pPr lvl="1"/>
+            <a:r>
+              <a:rPr lang="en-US" dirty="0"/>
+              <a:t>was a Programming Languages nerd, mostly with Rust</a:t>
+            </a:r>
+          </a:p>
+          <a:p>
+            <a:pPr lvl="1"/>
+            <a:r>
+              <a:rPr lang="en-US" dirty="0"/>
+              <a:t>teaching CS3210 (Parallel Programming) as well this semester</a:t>
+            </a:r>
+          </a:p>
+          <a:p>
+            <a:r>
+              <a:rPr lang="en-US" dirty="0"/>
+              <a:t>Plays too </a:t>
+            </a:r>
+            <a:r>
+              <a:rPr lang="en-US"/>
+              <a:t>much rhythm games and Final </a:t>
+            </a:r>
+            <a:r>
+              <a:rPr lang="en-US" dirty="0"/>
+              <a:t>Fantasy XIV</a:t>
+            </a:r>
+          </a:p>
+          <a:p>
+            <a:r>
+              <a:rPr lang="en-US" dirty="0"/>
+              <a:t>Out-of-tutorial communication:</a:t>
+            </a:r>
+          </a:p>
+          <a:p>
+            <a:pPr lvl="1"/>
+            <a:r>
+              <a:rPr lang="en-US" dirty="0"/>
+              <a:t>Email: </a:t>
+            </a:r>
+            <a:r>
+              <a:rPr lang="en-US" dirty="0">
+                <a:hlinkClick r:id="rId3"/>
+              </a:rPr>
+              <a:t>theo@comp.nus.edu.sg</a:t>
+            </a:r>
+            <a:r>
+              <a:rPr lang="en-US" dirty="0"/>
+              <a:t> for consults, questions</a:t>
+            </a:r>
+          </a:p>
+          <a:p>
+            <a:pPr lvl="1"/>
+            <a:r>
+              <a:rPr lang="en-US" dirty="0"/>
+              <a:t>Telegram: next slide</a:t>
+            </a:r>
+          </a:p>
+          <a:p>
+            <a:pPr lvl="1"/>
+            <a:r>
+              <a:rPr lang="en-US" dirty="0"/>
+              <a:t>Will reply messages within 24 hours – </a:t>
+            </a:r>
+            <a:r>
+              <a:rPr lang="en-US" dirty="0">
+                <a:latin typeface="AndesNeue Alt 2 Book it" panose="00000500000000000000" pitchFamily="2" charset="0"/>
+              </a:rPr>
+              <a:t>except 2 days before deadlines</a:t>
+            </a:r>
+          </a:p>
+          <a:p>
+            <a:pPr lvl="1"/>
             <a:endParaRPr lang="en-US" dirty="0"/>
           </a:p>
           <a:p>
-            <a:pPr marL="514350" indent="-514350">
-              <a:lnSpc>
-                <a:spcPct val="150000"/>
-              </a:lnSpc>
-              <a:buFont typeface="Arial" panose="020B0604020202020204" pitchFamily="34" charset="0"/>
-              <a:buAutoNum type="alphaLcParenBoth"/>
-            </a:pPr>
-            <a:r>
-              <a:rPr lang="en-SG" sz="2800" dirty="0"/>
-              <a:t>(1101.100)</a:t>
-            </a:r>
-            <a:r>
-              <a:rPr lang="en-SG" sz="2800" baseline="-25000" dirty="0"/>
-              <a:t>2s</a:t>
-            </a:r>
-            <a:r>
-              <a:rPr lang="en-SG" sz="2800" dirty="0"/>
-              <a:t> 	= –(0010.100)</a:t>
-            </a:r>
-            <a:r>
-              <a:rPr lang="en-SG" sz="2800" baseline="-25000" dirty="0"/>
-              <a:t>2</a:t>
-            </a:r>
-            <a:r>
-              <a:rPr lang="en-SG" sz="2800" dirty="0"/>
-              <a:t> 	= –(2</a:t>
-            </a:r>
-            <a:r>
-              <a:rPr lang="en-SG" sz="2800" baseline="30000" dirty="0"/>
-              <a:t>1</a:t>
-            </a:r>
-            <a:r>
-              <a:rPr lang="en-SG" sz="2800" dirty="0"/>
-              <a:t> + 2</a:t>
-            </a:r>
-            <a:r>
-              <a:rPr lang="en-SG" sz="2800" baseline="30000" dirty="0"/>
-              <a:t>-1</a:t>
-            </a:r>
-            <a:r>
-              <a:rPr lang="en-SG" sz="2800" dirty="0"/>
-              <a:t>) 			= –2.5 </a:t>
-            </a:r>
             <a:endParaRPr lang="en-US" dirty="0"/>
-          </a:p>
-          <a:p>
-            <a:pPr marL="514350" indent="-514350">
-              <a:lnSpc>
-                <a:spcPct val="150000"/>
-              </a:lnSpc>
-              <a:buFont typeface="Arial" panose="020B0604020202020204" pitchFamily="34" charset="0"/>
-              <a:buAutoNum type="alphaLcParenBoth"/>
-            </a:pPr>
-            <a:r>
-              <a:rPr lang="en-SG" sz="2800" dirty="0"/>
-              <a:t>(0011.111)</a:t>
-            </a:r>
-            <a:r>
-              <a:rPr lang="en-SG" sz="2800" baseline="-25000" dirty="0"/>
-              <a:t>2s</a:t>
-            </a:r>
-            <a:r>
-              <a:rPr lang="en-SG" sz="2800" dirty="0"/>
-              <a:t> 	= (0011.111)</a:t>
-            </a:r>
-            <a:r>
-              <a:rPr lang="en-SG" sz="2800" baseline="-25000" dirty="0"/>
-              <a:t>2</a:t>
-            </a:r>
-            <a:r>
-              <a:rPr lang="en-SG" sz="2800" dirty="0"/>
-              <a:t> 		= 2</a:t>
-            </a:r>
-            <a:r>
-              <a:rPr lang="en-SG" sz="2800" baseline="30000" dirty="0"/>
-              <a:t>1</a:t>
-            </a:r>
-            <a:r>
-              <a:rPr lang="en-SG" sz="2800" dirty="0"/>
-              <a:t> + 2</a:t>
-            </a:r>
-            <a:r>
-              <a:rPr lang="en-SG" sz="2800" baseline="30000" dirty="0"/>
-              <a:t>0</a:t>
-            </a:r>
-            <a:r>
-              <a:rPr lang="en-SG" sz="2800" dirty="0"/>
-              <a:t>  + 2</a:t>
-            </a:r>
-            <a:r>
-              <a:rPr lang="en-SG" sz="2800" baseline="30000" dirty="0"/>
-              <a:t>-1</a:t>
-            </a:r>
-            <a:r>
-              <a:rPr lang="en-SG" sz="2800" dirty="0"/>
-              <a:t> + 2</a:t>
-            </a:r>
-            <a:r>
-              <a:rPr lang="en-SG" sz="2800" baseline="30000" dirty="0"/>
-              <a:t>-2</a:t>
-            </a:r>
-            <a:r>
-              <a:rPr lang="en-SG" sz="2800" dirty="0"/>
-              <a:t> + 2</a:t>
-            </a:r>
-            <a:r>
-              <a:rPr lang="en-SG" sz="2800" baseline="30000" dirty="0"/>
-              <a:t>-3	</a:t>
-            </a:r>
-            <a:r>
-              <a:rPr lang="en-SG" sz="2800" dirty="0"/>
-              <a:t>= 3.875</a:t>
-            </a:r>
-            <a:endParaRPr lang="en-US" dirty="0"/>
-          </a:p>
-          <a:p>
-            <a:pPr marL="514350" indent="-514350">
-              <a:lnSpc>
-                <a:spcPct val="150000"/>
-              </a:lnSpc>
-              <a:buFont typeface="Arial" panose="020B0604020202020204" pitchFamily="34" charset="0"/>
-              <a:buAutoNum type="alphaLcParenBoth"/>
-            </a:pPr>
-            <a:r>
-              <a:rPr lang="en-SG" sz="2800" dirty="0"/>
-              <a:t>(0010.001)</a:t>
-            </a:r>
-            <a:r>
-              <a:rPr lang="en-SG" sz="2800" baseline="-25000" dirty="0"/>
-              <a:t>2s</a:t>
-            </a:r>
-            <a:r>
-              <a:rPr lang="en-SG" sz="2800" dirty="0"/>
-              <a:t> 	= (0010.001)</a:t>
-            </a:r>
-            <a:r>
-              <a:rPr lang="en-SG" sz="2800" baseline="-25000" dirty="0"/>
-              <a:t>2	</a:t>
-            </a:r>
-            <a:r>
-              <a:rPr lang="en-SG" sz="2800" dirty="0"/>
-              <a:t>= 2</a:t>
-            </a:r>
-            <a:r>
-              <a:rPr lang="en-SG" sz="2800" baseline="30000" dirty="0"/>
-              <a:t>1</a:t>
-            </a:r>
-            <a:r>
-              <a:rPr lang="en-SG" sz="2800" dirty="0"/>
-              <a:t> + 2</a:t>
-            </a:r>
-            <a:r>
-              <a:rPr lang="en-SG" sz="2800" baseline="30000" dirty="0"/>
-              <a:t>-3</a:t>
-            </a:r>
-            <a:r>
-              <a:rPr lang="en-SG" sz="2800" dirty="0"/>
-              <a:t> </a:t>
-            </a:r>
-            <a:r>
-              <a:rPr lang="en-US" sz="2800" dirty="0"/>
-              <a:t>			</a:t>
-            </a:r>
-            <a:r>
-              <a:rPr lang="en-SG" sz="2800" dirty="0"/>
-              <a:t>= 2.125 </a:t>
-            </a:r>
           </a:p>
         </p:txBody>
       </p:sp>
     </p:spTree>
     <p:extLst>
       <p:ext uri="{BB962C8B-B14F-4D97-AF65-F5344CB8AC3E}">
-        <p14:creationId xmlns:p14="http://schemas.microsoft.com/office/powerpoint/2010/main" val="4143827740"/>
+        <p14:creationId xmlns:p14="http://schemas.microsoft.com/office/powerpoint/2010/main" val="2586703534"/>
       </p:ext>
     </p:extLst>
   </p:cSld>
@@ -10964,7 +9322,7 @@
 </p:sld>
 </file>
 
-<file path=ppt/slides/slide28.xml><?xml version="1.0" encoding="utf-8"?>
+<file path=ppt/slides/slide20.xml><?xml version="1.0" encoding="utf-8"?>
 <p:sld xmlns:a="http://schemas.openxmlformats.org/drawingml/2006/main" xmlns:r="http://schemas.openxmlformats.org/officeDocument/2006/relationships" xmlns:p="http://schemas.openxmlformats.org/presentationml/2006/main">
   <p:cSld>
     <p:spTree>
@@ -10986,6 +9344,335 @@
           <p:cNvPr id="2" name="Title 1">
             <a:extLst>
               <a:ext uri="{FF2B5EF4-FFF2-40B4-BE49-F238E27FC236}">
+                <a16:creationId xmlns:a16="http://schemas.microsoft.com/office/drawing/2014/main" id="{830F9886-B683-03A2-6169-B73C5DDBB242}"/>
+              </a:ext>
+            </a:extLst>
+          </p:cNvPr>
+          <p:cNvSpPr>
+            <a:spLocks noGrp="1"/>
+          </p:cNvSpPr>
+          <p:nvPr>
+            <p:ph type="title"/>
+          </p:nvPr>
+        </p:nvSpPr>
+        <p:spPr/>
+        <p:txBody>
+          <a:bodyPr/>
+          <a:lstStyle/>
+          <a:p>
+            <a:r>
+              <a:rPr lang="en-US" dirty="0"/>
+              <a:t>Q3. Decimal </a:t>
+            </a:r>
+            <a:r>
+              <a:rPr lang="en-US" dirty="0">
+                <a:sym typeface="Wingdings" panose="05000000000000000000" pitchFamily="2" charset="2"/>
+              </a:rPr>
+              <a:t> Fixed point binary</a:t>
+            </a:r>
+            <a:endParaRPr lang="en-US" dirty="0"/>
+          </a:p>
+        </p:txBody>
+      </p:sp>
+      <p:sp>
+        <p:nvSpPr>
+          <p:cNvPr id="3" name="Content Placeholder 2">
+            <a:extLst>
+              <a:ext uri="{FF2B5EF4-FFF2-40B4-BE49-F238E27FC236}">
+                <a16:creationId xmlns:a16="http://schemas.microsoft.com/office/drawing/2014/main" id="{FFCAE40F-544E-15CF-241A-4F3D4671E829}"/>
+              </a:ext>
+            </a:extLst>
+          </p:cNvPr>
+          <p:cNvSpPr>
+            <a:spLocks noGrp="1"/>
+          </p:cNvSpPr>
+          <p:nvPr>
+            <p:ph idx="1"/>
+          </p:nvPr>
+        </p:nvSpPr>
+        <p:spPr/>
+        <p:txBody>
+          <a:bodyPr>
+            <a:normAutofit/>
+          </a:bodyPr>
+          <a:lstStyle/>
+          <a:p>
+            <a:pPr marL="0" indent="0">
+              <a:buNone/>
+            </a:pPr>
+            <a:r>
+              <a:rPr lang="en-US" u="sng" dirty="0"/>
+              <a:t>Question</a:t>
+            </a:r>
+            <a:br>
+              <a:rPr lang="en-US" u="sng" dirty="0"/>
+            </a:br>
+            <a:r>
+              <a:rPr lang="en-US" dirty="0"/>
+              <a:t>Convert it back to decimal.</a:t>
+            </a:r>
+            <a:endParaRPr lang="en-US" u="sng" dirty="0"/>
+          </a:p>
+          <a:p>
+            <a:pPr marL="514350" indent="-514350">
+              <a:lnSpc>
+                <a:spcPct val="150000"/>
+              </a:lnSpc>
+              <a:buFont typeface="Arial" panose="020B0604020202020204" pitchFamily="34" charset="0"/>
+              <a:buAutoNum type="alphaLcParenBoth"/>
+            </a:pPr>
+            <a:r>
+              <a:rPr lang="en-SG" sz="2800" dirty="0"/>
+              <a:t>(0001.110)</a:t>
+            </a:r>
+            <a:r>
+              <a:rPr lang="en-SG" sz="2800" baseline="-25000" dirty="0"/>
+              <a:t>2s</a:t>
+            </a:r>
+            <a:r>
+              <a:rPr lang="en-SG" sz="2800" dirty="0"/>
+              <a:t> 	= (0001.110)</a:t>
+            </a:r>
+            <a:r>
+              <a:rPr lang="en-SG" sz="2800" baseline="-25000" dirty="0"/>
+              <a:t>2</a:t>
+            </a:r>
+            <a:r>
+              <a:rPr lang="en-SG" sz="2800" dirty="0"/>
+              <a:t> 	= 2</a:t>
+            </a:r>
+            <a:r>
+              <a:rPr lang="en-SG" sz="2800" baseline="30000" dirty="0"/>
+              <a:t>0</a:t>
+            </a:r>
+            <a:r>
+              <a:rPr lang="en-SG" sz="2800" dirty="0"/>
+              <a:t> + 2</a:t>
+            </a:r>
+            <a:r>
+              <a:rPr lang="en-SG" sz="2800" baseline="30000" dirty="0"/>
+              <a:t>-1</a:t>
+            </a:r>
+            <a:r>
+              <a:rPr lang="en-SG" sz="2800" dirty="0"/>
+              <a:t> + 2</a:t>
+            </a:r>
+            <a:r>
+              <a:rPr lang="en-SG" sz="2800" baseline="30000" dirty="0"/>
+              <a:t>-2</a:t>
+            </a:r>
+            <a:r>
+              <a:rPr lang="en-SG" sz="2800" dirty="0"/>
+              <a:t> 		= 1.75</a:t>
+            </a:r>
+            <a:endParaRPr lang="en-US" dirty="0"/>
+          </a:p>
+          <a:p>
+            <a:pPr marL="514350" indent="-514350">
+              <a:lnSpc>
+                <a:spcPct val="150000"/>
+              </a:lnSpc>
+              <a:buFont typeface="Arial" panose="020B0604020202020204" pitchFamily="34" charset="0"/>
+              <a:buAutoNum type="alphaLcParenBoth"/>
+            </a:pPr>
+            <a:r>
+              <a:rPr lang="en-SG" sz="2800" dirty="0"/>
+              <a:t>(1101.100)</a:t>
+            </a:r>
+            <a:r>
+              <a:rPr lang="en-SG" sz="2800" baseline="-25000" dirty="0"/>
+              <a:t>2s</a:t>
+            </a:r>
+            <a:r>
+              <a:rPr lang="en-SG" sz="2800" dirty="0"/>
+              <a:t> 	= –(0010.100)</a:t>
+            </a:r>
+            <a:r>
+              <a:rPr lang="en-SG" sz="2800" baseline="-25000" dirty="0"/>
+              <a:t>2</a:t>
+            </a:r>
+            <a:r>
+              <a:rPr lang="en-SG" sz="2800" dirty="0"/>
+              <a:t> 	= –(2</a:t>
+            </a:r>
+            <a:r>
+              <a:rPr lang="en-SG" sz="2800" baseline="30000" dirty="0"/>
+              <a:t>1</a:t>
+            </a:r>
+            <a:r>
+              <a:rPr lang="en-SG" sz="2800" dirty="0"/>
+              <a:t> + 2</a:t>
+            </a:r>
+            <a:r>
+              <a:rPr lang="en-SG" sz="2800" baseline="30000" dirty="0"/>
+              <a:t>-1</a:t>
+            </a:r>
+            <a:r>
+              <a:rPr lang="en-SG" sz="2800" dirty="0"/>
+              <a:t>) 			= –2.5 </a:t>
+            </a:r>
+            <a:endParaRPr lang="en-US" dirty="0"/>
+          </a:p>
+          <a:p>
+            <a:pPr marL="514350" indent="-514350">
+              <a:lnSpc>
+                <a:spcPct val="150000"/>
+              </a:lnSpc>
+              <a:buFont typeface="Arial" panose="020B0604020202020204" pitchFamily="34" charset="0"/>
+              <a:buAutoNum type="alphaLcParenBoth"/>
+            </a:pPr>
+            <a:r>
+              <a:rPr lang="en-SG" sz="2800" dirty="0"/>
+              <a:t>(0011.111)</a:t>
+            </a:r>
+            <a:r>
+              <a:rPr lang="en-SG" sz="2800" baseline="-25000" dirty="0"/>
+              <a:t>2s</a:t>
+            </a:r>
+            <a:r>
+              <a:rPr lang="en-SG" sz="2800" dirty="0"/>
+              <a:t> 	= (0011.111)</a:t>
+            </a:r>
+            <a:r>
+              <a:rPr lang="en-SG" sz="2800" baseline="-25000" dirty="0"/>
+              <a:t>2</a:t>
+            </a:r>
+            <a:r>
+              <a:rPr lang="en-SG" sz="2800" dirty="0"/>
+              <a:t> 		= 2</a:t>
+            </a:r>
+            <a:r>
+              <a:rPr lang="en-SG" sz="2800" baseline="30000" dirty="0"/>
+              <a:t>1</a:t>
+            </a:r>
+            <a:r>
+              <a:rPr lang="en-SG" sz="2800" dirty="0"/>
+              <a:t> + 2</a:t>
+            </a:r>
+            <a:r>
+              <a:rPr lang="en-SG" sz="2800" baseline="30000" dirty="0"/>
+              <a:t>0</a:t>
+            </a:r>
+            <a:r>
+              <a:rPr lang="en-SG" sz="2800" dirty="0"/>
+              <a:t>  + 2</a:t>
+            </a:r>
+            <a:r>
+              <a:rPr lang="en-SG" sz="2800" baseline="30000" dirty="0"/>
+              <a:t>-1</a:t>
+            </a:r>
+            <a:r>
+              <a:rPr lang="en-SG" sz="2800" dirty="0"/>
+              <a:t> + 2</a:t>
+            </a:r>
+            <a:r>
+              <a:rPr lang="en-SG" sz="2800" baseline="30000" dirty="0"/>
+              <a:t>-2</a:t>
+            </a:r>
+            <a:r>
+              <a:rPr lang="en-SG" sz="2800" dirty="0"/>
+              <a:t> + 2</a:t>
+            </a:r>
+            <a:r>
+              <a:rPr lang="en-SG" sz="2800" baseline="30000" dirty="0"/>
+              <a:t>-3	</a:t>
+            </a:r>
+            <a:r>
+              <a:rPr lang="en-SG" sz="2800" dirty="0"/>
+              <a:t>= 3.875</a:t>
+            </a:r>
+            <a:endParaRPr lang="en-US" dirty="0"/>
+          </a:p>
+          <a:p>
+            <a:pPr marL="514350" indent="-514350">
+              <a:lnSpc>
+                <a:spcPct val="150000"/>
+              </a:lnSpc>
+              <a:buFont typeface="Arial" panose="020B0604020202020204" pitchFamily="34" charset="0"/>
+              <a:buAutoNum type="alphaLcParenBoth"/>
+            </a:pPr>
+            <a:r>
+              <a:rPr lang="en-SG" sz="2800" dirty="0"/>
+              <a:t>(0010.001)</a:t>
+            </a:r>
+            <a:r>
+              <a:rPr lang="en-SG" sz="2800" baseline="-25000" dirty="0"/>
+              <a:t>2s</a:t>
+            </a:r>
+            <a:r>
+              <a:rPr lang="en-SG" sz="2800" dirty="0"/>
+              <a:t> 	= (0010.001)</a:t>
+            </a:r>
+            <a:r>
+              <a:rPr lang="en-SG" sz="2800" baseline="-25000" dirty="0"/>
+              <a:t>2	</a:t>
+            </a:r>
+            <a:r>
+              <a:rPr lang="en-SG" sz="2800" dirty="0"/>
+              <a:t>= 2</a:t>
+            </a:r>
+            <a:r>
+              <a:rPr lang="en-SG" sz="2800" baseline="30000" dirty="0"/>
+              <a:t>1</a:t>
+            </a:r>
+            <a:r>
+              <a:rPr lang="en-SG" sz="2800" dirty="0"/>
+              <a:t> + 2</a:t>
+            </a:r>
+            <a:r>
+              <a:rPr lang="en-SG" sz="2800" baseline="30000" dirty="0"/>
+              <a:t>-3</a:t>
+            </a:r>
+            <a:r>
+              <a:rPr lang="en-SG" sz="2800" dirty="0"/>
+              <a:t> </a:t>
+            </a:r>
+            <a:r>
+              <a:rPr lang="en-US" sz="2800" dirty="0"/>
+              <a:t>			</a:t>
+            </a:r>
+            <a:r>
+              <a:rPr lang="en-SG" sz="2800" dirty="0"/>
+              <a:t>= 2.125 </a:t>
+            </a:r>
+          </a:p>
+        </p:txBody>
+      </p:sp>
+    </p:spTree>
+    <p:extLst>
+      <p:ext uri="{BB962C8B-B14F-4D97-AF65-F5344CB8AC3E}">
+        <p14:creationId xmlns:p14="http://schemas.microsoft.com/office/powerpoint/2010/main" val="4143827740"/>
+      </p:ext>
+    </p:extLst>
+  </p:cSld>
+  <p:clrMapOvr>
+    <a:masterClrMapping/>
+  </p:clrMapOvr>
+</p:sld>
+</file>
+
+<file path=ppt/slides/slide21.xml><?xml version="1.0" encoding="utf-8"?>
+<p:sld xmlns:a="http://schemas.openxmlformats.org/drawingml/2006/main" xmlns:r="http://schemas.openxmlformats.org/officeDocument/2006/relationships" xmlns:p="http://schemas.openxmlformats.org/presentationml/2006/main">
+  <p:cSld>
+    <p:spTree>
+      <p:nvGrpSpPr>
+        <p:cNvPr id="1" name=""/>
+        <p:cNvGrpSpPr/>
+        <p:nvPr/>
+      </p:nvGrpSpPr>
+      <p:grpSpPr>
+        <a:xfrm>
+          <a:off x="0" y="0"/>
+          <a:ext cx="0" cy="0"/>
+          <a:chOff x="0" y="0"/>
+          <a:chExt cx="0" cy="0"/>
+        </a:xfrm>
+      </p:grpSpPr>
+      <p:sp>
+        <p:nvSpPr>
+          <p:cNvPr id="2" name="Title 1">
+            <a:extLst>
+              <a:ext uri="{FF2B5EF4-FFF2-40B4-BE49-F238E27FC236}">
                 <a16:creationId xmlns:a16="http://schemas.microsoft.com/office/drawing/2014/main" id="{F418A35F-EB19-C1A1-D162-CF997A025E36}"/>
               </a:ext>
             </a:extLst>
@@ -11195,7 +9882,7 @@
 </p:sld>
 </file>
 
-<file path=ppt/slides/slide29.xml><?xml version="1.0" encoding="utf-8"?>
+<file path=ppt/slides/slide22.xml><?xml version="1.0" encoding="utf-8"?>
 <p:sld xmlns:a="http://schemas.openxmlformats.org/drawingml/2006/main" xmlns:r="http://schemas.openxmlformats.org/officeDocument/2006/relationships" xmlns:p="http://schemas.openxmlformats.org/presentationml/2006/main">
   <p:cSld>
     <p:spTree>
@@ -12576,271 +11263,7 @@
 </p:sld>
 </file>
 
-<file path=ppt/slides/slide3.xml><?xml version="1.0" encoding="utf-8"?>
-<p:sld xmlns:a="http://schemas.openxmlformats.org/drawingml/2006/main" xmlns:r="http://schemas.openxmlformats.org/officeDocument/2006/relationships" xmlns:p="http://schemas.openxmlformats.org/presentationml/2006/main">
-  <p:cSld>
-    <p:spTree>
-      <p:nvGrpSpPr>
-        <p:cNvPr id="1" name=""/>
-        <p:cNvGrpSpPr/>
-        <p:nvPr/>
-      </p:nvGrpSpPr>
-      <p:grpSpPr>
-        <a:xfrm>
-          <a:off x="0" y="0"/>
-          <a:ext cx="0" cy="0"/>
-          <a:chOff x="0" y="0"/>
-          <a:chExt cx="0" cy="0"/>
-        </a:xfrm>
-      </p:grpSpPr>
-      <p:sp>
-        <p:nvSpPr>
-          <p:cNvPr id="2" name="Title 1">
-            <a:extLst>
-              <a:ext uri="{FF2B5EF4-FFF2-40B4-BE49-F238E27FC236}">
-                <a16:creationId xmlns:a16="http://schemas.microsoft.com/office/drawing/2014/main" id="{F846E162-1F71-4B5A-F685-F41006BA6AC2}"/>
-              </a:ext>
-            </a:extLst>
-          </p:cNvPr>
-          <p:cNvSpPr>
-            <a:spLocks noGrp="1"/>
-          </p:cNvSpPr>
-          <p:nvPr>
-            <p:ph type="title"/>
-          </p:nvPr>
-        </p:nvSpPr>
-        <p:spPr/>
-        <p:txBody>
-          <a:bodyPr/>
-          <a:lstStyle/>
-          <a:p>
-            <a:r>
-              <a:rPr lang="en-US" dirty="0"/>
-              <a:t>Quick admin stuff</a:t>
-            </a:r>
-          </a:p>
-        </p:txBody>
-      </p:sp>
-      <p:sp>
-        <p:nvSpPr>
-          <p:cNvPr id="3" name="Content Placeholder 2">
-            <a:extLst>
-              <a:ext uri="{FF2B5EF4-FFF2-40B4-BE49-F238E27FC236}">
-                <a16:creationId xmlns:a16="http://schemas.microsoft.com/office/drawing/2014/main" id="{23BBDEF9-7024-1337-E6A5-0A13F8EEDDE0}"/>
-              </a:ext>
-            </a:extLst>
-          </p:cNvPr>
-          <p:cNvSpPr>
-            <a:spLocks noGrp="1"/>
-          </p:cNvSpPr>
-          <p:nvPr>
-            <p:ph idx="1"/>
-          </p:nvPr>
-        </p:nvSpPr>
-        <p:spPr>
-          <a:xfrm>
-            <a:off x="838200" y="1825625"/>
-            <a:ext cx="10515600" cy="4908550"/>
-          </a:xfrm>
-        </p:spPr>
-        <p:txBody>
-          <a:bodyPr>
-            <a:normAutofit lnSpcReduction="10000"/>
-          </a:bodyPr>
-          <a:lstStyle/>
-          <a:p>
-            <a:pPr marL="0" indent="0">
-              <a:buNone/>
-            </a:pPr>
-            <a:r>
-              <a:rPr lang="en-US" sz="3200" dirty="0"/>
-              <a:t>Telegram:</a:t>
-            </a:r>
-            <a:endParaRPr lang="en-US" dirty="0"/>
-          </a:p>
-          <a:p>
-            <a:r>
-              <a:rPr lang="en-US" dirty="0">
-                <a:solidFill>
-                  <a:schemeClr val="bg1">
-                    <a:lumMod val="50000"/>
-                  </a:schemeClr>
-                </a:solidFill>
-                <a:latin typeface="AndesNeue Alt 2 Book it" panose="00000500000000000000" pitchFamily="2" charset="0"/>
-              </a:rPr>
-              <a:t>No groups for this semester sorry </a:t>
-            </a:r>
-            <a:r>
-              <a:rPr lang="en-US" dirty="0">
-                <a:solidFill>
-                  <a:schemeClr val="bg1">
-                    <a:lumMod val="50000"/>
-                  </a:schemeClr>
-                </a:solidFill>
-                <a:latin typeface="AndesNeue Alt 2 Book it" panose="00000500000000000000" pitchFamily="2" charset="0"/>
-                <a:sym typeface="Wingdings" panose="05000000000000000000" pitchFamily="2" charset="2"/>
-              </a:rPr>
-              <a:t>:(</a:t>
-            </a:r>
-          </a:p>
-          <a:p>
-            <a:pPr lvl="1"/>
-            <a:r>
-              <a:rPr lang="en-US" dirty="0">
-                <a:solidFill>
-                  <a:schemeClr val="bg1">
-                    <a:lumMod val="50000"/>
-                  </a:schemeClr>
-                </a:solidFill>
-                <a:latin typeface="AndesNeue Alt 2 Book it" panose="00000500000000000000" pitchFamily="2" charset="0"/>
-                <a:sym typeface="Wingdings" panose="05000000000000000000" pitchFamily="2" charset="2"/>
-              </a:rPr>
-              <a:t>I’m teaching 8 tutorial groups, so that’s </a:t>
-            </a:r>
-            <a:r>
-              <a:rPr lang="en-US" dirty="0" err="1">
-                <a:solidFill>
-                  <a:schemeClr val="bg1">
-                    <a:lumMod val="50000"/>
-                  </a:schemeClr>
-                </a:solidFill>
-                <a:latin typeface="AndesNeue Alt 2 Book it" panose="00000500000000000000" pitchFamily="2" charset="0"/>
-                <a:sym typeface="Wingdings" panose="05000000000000000000" pitchFamily="2" charset="2"/>
-              </a:rPr>
-              <a:t>gonna</a:t>
-            </a:r>
-            <a:r>
-              <a:rPr lang="en-US" dirty="0">
-                <a:solidFill>
-                  <a:schemeClr val="bg1">
-                    <a:lumMod val="50000"/>
-                  </a:schemeClr>
-                </a:solidFill>
-                <a:latin typeface="AndesNeue Alt 2 Book it" panose="00000500000000000000" pitchFamily="2" charset="0"/>
-                <a:sym typeface="Wingdings" panose="05000000000000000000" pitchFamily="2" charset="2"/>
-              </a:rPr>
-              <a:t> be a lot of telegram chats</a:t>
-            </a:r>
-          </a:p>
-          <a:p>
-            <a:pPr lvl="1"/>
-            <a:r>
-              <a:rPr lang="en-US" dirty="0">
-                <a:solidFill>
-                  <a:schemeClr val="bg1">
-                    <a:lumMod val="50000"/>
-                  </a:schemeClr>
-                </a:solidFill>
-                <a:latin typeface="AndesNeue Alt 2 Book it" panose="00000500000000000000" pitchFamily="2" charset="0"/>
-                <a:sym typeface="Wingdings" panose="05000000000000000000" pitchFamily="2" charset="2"/>
-              </a:rPr>
-              <a:t>If I combine all into 1 chat, that’s already ¼ of the cohort</a:t>
-            </a:r>
-          </a:p>
-          <a:p>
-            <a:r>
-              <a:rPr lang="en-US" dirty="0"/>
-              <a:t>Reachable via </a:t>
-            </a:r>
-            <a:r>
-              <a:rPr lang="en-US" dirty="0">
-                <a:hlinkClick r:id="rId3"/>
-              </a:rPr>
-              <a:t>@kagamination</a:t>
-            </a:r>
-            <a:r>
-              <a:rPr lang="en-US" dirty="0"/>
-              <a:t> on telegram</a:t>
-            </a:r>
-            <a:endParaRPr lang="en-US" dirty="0">
-              <a:latin typeface="AndesNeue Alt 2 Book it" panose="00000500000000000000" pitchFamily="2" charset="0"/>
-            </a:endParaRPr>
-          </a:p>
-          <a:p>
-            <a:pPr marL="457200" lvl="1" indent="0">
-              <a:buNone/>
-            </a:pPr>
-            <a:r>
-              <a:rPr lang="en-US" sz="600" dirty="0">
-                <a:solidFill>
-                  <a:schemeClr val="bg1">
-                    <a:lumMod val="50000"/>
-                  </a:schemeClr>
-                </a:solidFill>
-                <a:latin typeface="AndesNeue Alt 2 Book it" panose="00000500000000000000" pitchFamily="2" charset="0"/>
-              </a:rPr>
-              <a:t> 	</a:t>
-            </a:r>
-          </a:p>
-          <a:p>
-            <a:pPr marL="0" indent="0">
-              <a:buNone/>
-            </a:pPr>
-            <a:endParaRPr lang="en-US" sz="2800" dirty="0"/>
-          </a:p>
-          <a:p>
-            <a:pPr marL="0" indent="0">
-              <a:buNone/>
-            </a:pPr>
-            <a:r>
-              <a:rPr lang="en-US" sz="2800" dirty="0"/>
-              <a:t>Slides will be uploaded here: 	</a:t>
-            </a:r>
-            <a:r>
-              <a:rPr lang="en-US" sz="2800" dirty="0">
-                <a:hlinkClick r:id="rId4"/>
-              </a:rPr>
-              <a:t>https://github.com/theodoreleebrant/TA-2425S1</a:t>
-            </a:r>
-            <a:r>
-              <a:rPr lang="en-US" sz="2800" dirty="0"/>
-              <a:t> </a:t>
-            </a:r>
-          </a:p>
-          <a:p>
-            <a:pPr marL="0" indent="0">
-              <a:buNone/>
-            </a:pPr>
-            <a:endParaRPr lang="en-US" sz="2800" dirty="0"/>
-          </a:p>
-          <a:p>
-            <a:pPr marL="0" indent="0">
-              <a:buNone/>
-            </a:pPr>
-            <a:r>
-              <a:rPr lang="en-US" dirty="0"/>
-              <a:t>Anonymous feedback: </a:t>
-            </a:r>
-            <a:r>
-              <a:rPr lang="en-US" dirty="0">
-                <a:hlinkClick r:id="rId5"/>
-              </a:rPr>
-              <a:t>bit.ly/feedback-theodore</a:t>
-            </a:r>
-            <a:r>
-              <a:rPr lang="en-US" dirty="0"/>
-              <a:t> </a:t>
-            </a:r>
-          </a:p>
-          <a:p>
-            <a:endParaRPr lang="en-US" dirty="0"/>
-          </a:p>
-        </p:txBody>
-      </p:sp>
-    </p:spTree>
-    <p:extLst>
-      <p:ext uri="{BB962C8B-B14F-4D97-AF65-F5344CB8AC3E}">
-        <p14:creationId xmlns:p14="http://schemas.microsoft.com/office/powerpoint/2010/main" val="2240232242"/>
-      </p:ext>
-    </p:extLst>
-  </p:cSld>
-  <p:clrMapOvr>
-    <a:masterClrMapping/>
-  </p:clrMapOvr>
-</p:sld>
-</file>
-
-<file path=ppt/slides/slide30.xml><?xml version="1.0" encoding="utf-8"?>
+<file path=ppt/slides/slide23.xml><?xml version="1.0" encoding="utf-8"?>
 <p:sld xmlns:a="http://schemas.openxmlformats.org/drawingml/2006/main" xmlns:r="http://schemas.openxmlformats.org/officeDocument/2006/relationships" xmlns:p="http://schemas.openxmlformats.org/presentationml/2006/main">
   <p:cSld>
     <p:spTree>
@@ -13421,7 +11844,7 @@
 </p:sld>
 </file>
 
-<file path=ppt/slides/slide31.xml><?xml version="1.0" encoding="utf-8"?>
+<file path=ppt/slides/slide24.xml><?xml version="1.0" encoding="utf-8"?>
 <p:sld xmlns:a="http://schemas.openxmlformats.org/drawingml/2006/main" xmlns:r="http://schemas.openxmlformats.org/officeDocument/2006/relationships" xmlns:p="http://schemas.openxmlformats.org/presentationml/2006/main">
   <p:cSld>
     <p:spTree>
@@ -13533,7 +11956,7 @@
 </p:sld>
 </file>
 
-<file path=ppt/slides/slide32.xml><?xml version="1.0" encoding="utf-8"?>
+<file path=ppt/slides/slide25.xml><?xml version="1.0" encoding="utf-8"?>
 <p:sld xmlns:a="http://schemas.openxmlformats.org/drawingml/2006/main" xmlns:r="http://schemas.openxmlformats.org/officeDocument/2006/relationships" xmlns:p="http://schemas.openxmlformats.org/presentationml/2006/main">
   <p:cSld>
     <p:spTree>
@@ -13806,7 +12229,7 @@
 </p:sld>
 </file>
 
-<file path=ppt/slides/slide33.xml><?xml version="1.0" encoding="utf-8"?>
+<file path=ppt/slides/slide26.xml><?xml version="1.0" encoding="utf-8"?>
 <p:sld xmlns:a="http://schemas.openxmlformats.org/drawingml/2006/main" xmlns:r="http://schemas.openxmlformats.org/officeDocument/2006/relationships" xmlns:p="http://schemas.openxmlformats.org/presentationml/2006/main">
   <p:cSld>
     <p:spTree>
@@ -13918,7 +12341,7 @@
 </p:sld>
 </file>
 
-<file path=ppt/slides/slide34.xml><?xml version="1.0" encoding="utf-8"?>
+<file path=ppt/slides/slide27.xml><?xml version="1.0" encoding="utf-8"?>
 <p:sld xmlns:a="http://schemas.openxmlformats.org/drawingml/2006/main" xmlns:r="http://schemas.openxmlformats.org/officeDocument/2006/relationships" xmlns:p="http://schemas.openxmlformats.org/presentationml/2006/main">
   <p:cSld>
     <p:spTree>
@@ -14128,10 +12551,309 @@
           </a:prstGeom>
         </p:spPr>
       </p:pic>
+      <p:sp>
+        <p:nvSpPr>
+          <p:cNvPr id="4" name="TextBox 3">
+            <a:extLst>
+              <a:ext uri="{FF2B5EF4-FFF2-40B4-BE49-F238E27FC236}">
+                <a16:creationId xmlns:a16="http://schemas.microsoft.com/office/drawing/2014/main" id="{4E9E19E4-0AC7-0440-7EAA-BF7B627376B0}"/>
+              </a:ext>
+            </a:extLst>
+          </p:cNvPr>
+          <p:cNvSpPr txBox="1"/>
+          <p:nvPr/>
+        </p:nvSpPr>
+        <p:spPr>
+          <a:xfrm>
+            <a:off x="0" y="6488668"/>
+            <a:ext cx="5369668" cy="369332"/>
+          </a:xfrm>
+          <a:prstGeom prst="rect">
+            <a:avLst/>
+          </a:prstGeom>
+          <a:noFill/>
+        </p:spPr>
+        <p:txBody>
+          <a:bodyPr wrap="square" rtlCol="0">
+            <a:spAutoFit/>
+          </a:bodyPr>
+          <a:lstStyle/>
+          <a:p>
+            <a:r>
+              <a:rPr lang="en-SG"/>
+              <a:t>(Also reminder for me to take attendance)</a:t>
+            </a:r>
+          </a:p>
+        </p:txBody>
+      </p:sp>
     </p:spTree>
     <p:extLst>
       <p:ext uri="{BB962C8B-B14F-4D97-AF65-F5344CB8AC3E}">
         <p14:creationId xmlns:p14="http://schemas.microsoft.com/office/powerpoint/2010/main" val="1422821843"/>
+      </p:ext>
+    </p:extLst>
+  </p:cSld>
+  <p:clrMapOvr>
+    <a:masterClrMapping/>
+  </p:clrMapOvr>
+</p:sld>
+</file>
+
+<file path=ppt/slides/slide3.xml><?xml version="1.0" encoding="utf-8"?>
+<p:sld xmlns:a="http://schemas.openxmlformats.org/drawingml/2006/main" xmlns:r="http://schemas.openxmlformats.org/officeDocument/2006/relationships" xmlns:p="http://schemas.openxmlformats.org/presentationml/2006/main">
+  <p:cSld>
+    <p:spTree>
+      <p:nvGrpSpPr>
+        <p:cNvPr id="1" name=""/>
+        <p:cNvGrpSpPr/>
+        <p:nvPr/>
+      </p:nvGrpSpPr>
+      <p:grpSpPr>
+        <a:xfrm>
+          <a:off x="0" y="0"/>
+          <a:ext cx="0" cy="0"/>
+          <a:chOff x="0" y="0"/>
+          <a:chExt cx="0" cy="0"/>
+        </a:xfrm>
+      </p:grpSpPr>
+      <p:sp>
+        <p:nvSpPr>
+          <p:cNvPr id="2" name="Title 1">
+            <a:extLst>
+              <a:ext uri="{FF2B5EF4-FFF2-40B4-BE49-F238E27FC236}">
+                <a16:creationId xmlns:a16="http://schemas.microsoft.com/office/drawing/2014/main" id="{F846E162-1F71-4B5A-F685-F41006BA6AC2}"/>
+              </a:ext>
+            </a:extLst>
+          </p:cNvPr>
+          <p:cNvSpPr>
+            <a:spLocks noGrp="1"/>
+          </p:cNvSpPr>
+          <p:nvPr>
+            <p:ph type="title"/>
+          </p:nvPr>
+        </p:nvSpPr>
+        <p:spPr/>
+        <p:txBody>
+          <a:bodyPr/>
+          <a:lstStyle/>
+          <a:p>
+            <a:r>
+              <a:rPr lang="en-US" dirty="0"/>
+              <a:t>Quick admin stuff</a:t>
+            </a:r>
+          </a:p>
+        </p:txBody>
+      </p:sp>
+      <p:sp>
+        <p:nvSpPr>
+          <p:cNvPr id="3" name="Content Placeholder 2">
+            <a:extLst>
+              <a:ext uri="{FF2B5EF4-FFF2-40B4-BE49-F238E27FC236}">
+                <a16:creationId xmlns:a16="http://schemas.microsoft.com/office/drawing/2014/main" id="{23BBDEF9-7024-1337-E6A5-0A13F8EEDDE0}"/>
+              </a:ext>
+            </a:extLst>
+          </p:cNvPr>
+          <p:cNvSpPr>
+            <a:spLocks noGrp="1"/>
+          </p:cNvSpPr>
+          <p:nvPr>
+            <p:ph idx="1"/>
+          </p:nvPr>
+        </p:nvSpPr>
+        <p:spPr>
+          <a:xfrm>
+            <a:off x="838200" y="1825625"/>
+            <a:ext cx="10515600" cy="4908550"/>
+          </a:xfrm>
+        </p:spPr>
+        <p:txBody>
+          <a:bodyPr>
+            <a:normAutofit lnSpcReduction="10000"/>
+          </a:bodyPr>
+          <a:lstStyle/>
+          <a:p>
+            <a:pPr marL="0" indent="0">
+              <a:buNone/>
+            </a:pPr>
+            <a:r>
+              <a:rPr lang="en-US" sz="3200" dirty="0"/>
+              <a:t>Telegram:</a:t>
+            </a:r>
+            <a:endParaRPr lang="en-US" dirty="0"/>
+          </a:p>
+          <a:p>
+            <a:r>
+              <a:rPr lang="en-US" dirty="0">
+                <a:solidFill>
+                  <a:schemeClr val="bg1">
+                    <a:lumMod val="50000"/>
+                  </a:schemeClr>
+                </a:solidFill>
+                <a:latin typeface="AndesNeue Alt 2 Book it" panose="00000500000000000000" pitchFamily="2" charset="0"/>
+              </a:rPr>
+              <a:t>No groups for this semester sorry </a:t>
+            </a:r>
+            <a:r>
+              <a:rPr lang="en-US" dirty="0">
+                <a:solidFill>
+                  <a:schemeClr val="bg1">
+                    <a:lumMod val="50000"/>
+                  </a:schemeClr>
+                </a:solidFill>
+                <a:latin typeface="AndesNeue Alt 2 Book it" panose="00000500000000000000" pitchFamily="2" charset="0"/>
+                <a:sym typeface="Wingdings" panose="05000000000000000000" pitchFamily="2" charset="2"/>
+              </a:rPr>
+              <a:t>:(</a:t>
+            </a:r>
+          </a:p>
+          <a:p>
+            <a:pPr lvl="1"/>
+            <a:r>
+              <a:rPr lang="en-US" dirty="0">
+                <a:solidFill>
+                  <a:schemeClr val="bg1">
+                    <a:lumMod val="50000"/>
+                  </a:schemeClr>
+                </a:solidFill>
+                <a:latin typeface="AndesNeue Alt 2 Book it" panose="00000500000000000000" pitchFamily="2" charset="0"/>
+                <a:sym typeface="Wingdings" panose="05000000000000000000" pitchFamily="2" charset="2"/>
+              </a:rPr>
+              <a:t>I’m teaching 8 tutorial groups, so that’s </a:t>
+            </a:r>
+            <a:r>
+              <a:rPr lang="en-US" dirty="0" err="1">
+                <a:solidFill>
+                  <a:schemeClr val="bg1">
+                    <a:lumMod val="50000"/>
+                  </a:schemeClr>
+                </a:solidFill>
+                <a:latin typeface="AndesNeue Alt 2 Book it" panose="00000500000000000000" pitchFamily="2" charset="0"/>
+                <a:sym typeface="Wingdings" panose="05000000000000000000" pitchFamily="2" charset="2"/>
+              </a:rPr>
+              <a:t>gonna</a:t>
+            </a:r>
+            <a:r>
+              <a:rPr lang="en-US" dirty="0">
+                <a:solidFill>
+                  <a:schemeClr val="bg1">
+                    <a:lumMod val="50000"/>
+                  </a:schemeClr>
+                </a:solidFill>
+                <a:latin typeface="AndesNeue Alt 2 Book it" panose="00000500000000000000" pitchFamily="2" charset="0"/>
+                <a:sym typeface="Wingdings" panose="05000000000000000000" pitchFamily="2" charset="2"/>
+              </a:rPr>
+              <a:t> be a lot of telegram chats</a:t>
+            </a:r>
+          </a:p>
+          <a:p>
+            <a:pPr lvl="1"/>
+            <a:r>
+              <a:rPr lang="en-US" dirty="0">
+                <a:solidFill>
+                  <a:schemeClr val="bg1">
+                    <a:lumMod val="50000"/>
+                  </a:schemeClr>
+                </a:solidFill>
+                <a:latin typeface="AndesNeue Alt 2 Book it" panose="00000500000000000000" pitchFamily="2" charset="0"/>
+                <a:sym typeface="Wingdings" panose="05000000000000000000" pitchFamily="2" charset="2"/>
+              </a:rPr>
+              <a:t>If I combine all into 1 chat, that’s already ¼ of the cohort</a:t>
+            </a:r>
+          </a:p>
+          <a:p>
+            <a:r>
+              <a:rPr lang="en-US" dirty="0"/>
+              <a:t>Reachable via </a:t>
+            </a:r>
+            <a:r>
+              <a:rPr lang="en-US" dirty="0">
+                <a:hlinkClick r:id="rId3"/>
+              </a:rPr>
+              <a:t>@kagamination</a:t>
+            </a:r>
+            <a:r>
+              <a:rPr lang="en-US" dirty="0"/>
+              <a:t> on telegram</a:t>
+            </a:r>
+            <a:endParaRPr lang="en-US" dirty="0">
+              <a:latin typeface="AndesNeue Alt 2 Book it" panose="00000500000000000000" pitchFamily="2" charset="0"/>
+            </a:endParaRPr>
+          </a:p>
+          <a:p>
+            <a:pPr marL="457200" lvl="1" indent="0">
+              <a:buNone/>
+            </a:pPr>
+            <a:r>
+              <a:rPr lang="en-US" sz="600" dirty="0">
+                <a:solidFill>
+                  <a:schemeClr val="bg1">
+                    <a:lumMod val="50000"/>
+                  </a:schemeClr>
+                </a:solidFill>
+                <a:latin typeface="AndesNeue Alt 2 Book it" panose="00000500000000000000" pitchFamily="2" charset="0"/>
+              </a:rPr>
+              <a:t> 	</a:t>
+            </a:r>
+          </a:p>
+          <a:p>
+            <a:pPr marL="0" indent="0">
+              <a:buNone/>
+            </a:pPr>
+            <a:endParaRPr lang="en-US" sz="2800" dirty="0"/>
+          </a:p>
+          <a:p>
+            <a:pPr marL="0" indent="0">
+              <a:buNone/>
+            </a:pPr>
+            <a:r>
+              <a:rPr lang="en-US" sz="2800" dirty="0"/>
+              <a:t>Slides will be uploaded here: 	</a:t>
+            </a:r>
+            <a:r>
+              <a:rPr lang="en-US" sz="2800" dirty="0">
+                <a:hlinkClick r:id="rId4"/>
+              </a:rPr>
+              <a:t>https://github.com/theodoreleebrant/TA-2425S1</a:t>
+            </a:r>
+            <a:r>
+              <a:rPr lang="en-US" sz="2800" dirty="0"/>
+              <a:t> </a:t>
+            </a:r>
+          </a:p>
+          <a:p>
+            <a:pPr marL="0" indent="0">
+              <a:buNone/>
+            </a:pPr>
+            <a:endParaRPr lang="en-US" sz="2800" dirty="0"/>
+          </a:p>
+          <a:p>
+            <a:pPr marL="0" indent="0">
+              <a:buNone/>
+            </a:pPr>
+            <a:r>
+              <a:rPr lang="en-US" dirty="0"/>
+              <a:t>Anonymous feedback: </a:t>
+            </a:r>
+            <a:r>
+              <a:rPr lang="en-US" dirty="0">
+                <a:hlinkClick r:id="rId5"/>
+              </a:rPr>
+              <a:t>bit.ly/feedback-theodore</a:t>
+            </a:r>
+            <a:r>
+              <a:rPr lang="en-US" dirty="0"/>
+              <a:t> </a:t>
+            </a:r>
+          </a:p>
+          <a:p>
+            <a:endParaRPr lang="en-US" dirty="0"/>
+          </a:p>
+        </p:txBody>
+      </p:sp>
+    </p:spTree>
+    <p:extLst>
+      <p:ext uri="{BB962C8B-B14F-4D97-AF65-F5344CB8AC3E}">
+        <p14:creationId xmlns:p14="http://schemas.microsoft.com/office/powerpoint/2010/main" val="2240232242"/>
       </p:ext>
     </p:extLst>
   </p:cSld>
@@ -16120,48 +14842,6 @@
     <a:masterClrMapping/>
   </p:clrMapOvr>
 </p:sld>
-</file>
-
-<file path=ppt/tags/tag1.xml><?xml version="1.0" encoding="utf-8"?>
-<p:tagLst xmlns:a="http://schemas.openxmlformats.org/drawingml/2006/main" xmlns:r="http://schemas.openxmlformats.org/officeDocument/2006/relationships" xmlns:p="http://schemas.openxmlformats.org/presentationml/2006/main">
-  <p:tag name="__PE_POLL_EMBED_ID" val="39c50a43-6995-4d24-a6d9-faa7ec490d64"/>
-</p:tagLst>
-</file>
-
-<file path=ppt/tags/tag2.xml><?xml version="1.0" encoding="utf-8"?>
-<p:tagLst xmlns:a="http://schemas.openxmlformats.org/drawingml/2006/main" xmlns:r="http://schemas.openxmlformats.org/officeDocument/2006/relationships" xmlns:p="http://schemas.openxmlformats.org/presentationml/2006/main">
-  <p:tag name="__PE_POLL_EMBED_ID" val="1fc96f4e-dfa2-43ef-b1a0-c76f65ae63ed"/>
-</p:tagLst>
-</file>
-
-<file path=ppt/tags/tag3.xml><?xml version="1.0" encoding="utf-8"?>
-<p:tagLst xmlns:a="http://schemas.openxmlformats.org/drawingml/2006/main" xmlns:r="http://schemas.openxmlformats.org/officeDocument/2006/relationships" xmlns:p="http://schemas.openxmlformats.org/presentationml/2006/main">
-  <p:tag name="__PE_POLL_EMBED_ID" val="7de95306-b5c1-4321-b306-6998f3be02be"/>
-</p:tagLst>
-</file>
-
-<file path=ppt/tags/tag4.xml><?xml version="1.0" encoding="utf-8"?>
-<p:tagLst xmlns:a="http://schemas.openxmlformats.org/drawingml/2006/main" xmlns:r="http://schemas.openxmlformats.org/officeDocument/2006/relationships" xmlns:p="http://schemas.openxmlformats.org/presentationml/2006/main">
-  <p:tag name="__PE_POLL_EMBED_ID" val="e9ea597b-b29f-471c-aacc-618f9846d5c6"/>
-</p:tagLst>
-</file>
-
-<file path=ppt/tags/tag5.xml><?xml version="1.0" encoding="utf-8"?>
-<p:tagLst xmlns:a="http://schemas.openxmlformats.org/drawingml/2006/main" xmlns:r="http://schemas.openxmlformats.org/officeDocument/2006/relationships" xmlns:p="http://schemas.openxmlformats.org/presentationml/2006/main">
-  <p:tag name="__PE_POLL_EMBED_ID" val="afdf2e55-1d8e-4abc-afd7-b60fbf906e59"/>
-</p:tagLst>
-</file>
-
-<file path=ppt/tags/tag6.xml><?xml version="1.0" encoding="utf-8"?>
-<p:tagLst xmlns:a="http://schemas.openxmlformats.org/drawingml/2006/main" xmlns:r="http://schemas.openxmlformats.org/officeDocument/2006/relationships" xmlns:p="http://schemas.openxmlformats.org/presentationml/2006/main">
-  <p:tag name="__PE_POLL_EMBED_ID" val="511f7434-6502-45a7-bffb-7963b9c871d4"/>
-</p:tagLst>
-</file>
-
-<file path=ppt/tags/tag7.xml><?xml version="1.0" encoding="utf-8"?>
-<p:tagLst xmlns:a="http://schemas.openxmlformats.org/drawingml/2006/main" xmlns:r="http://schemas.openxmlformats.org/officeDocument/2006/relationships" xmlns:p="http://schemas.openxmlformats.org/presentationml/2006/main">
-  <p:tag name="__PE_POLL_EMBED_ID" val="5fe5be27-1c34-4d98-9259-78de30795e06"/>
-</p:tagLst>
 </file>
 
 <file path=ppt/theme/theme1.xml><?xml version="1.0" encoding="utf-8"?>

</xml_diff>